<commit_message>
adding epochs and seperate ipynb stats file
</commit_message>
<xml_diff>
--- a/Figurer_PP.pptx
+++ b/Figurer_PP.pptx
@@ -6,6 +6,9 @@
   </p:sldMasterIdLst>
   <p:sldIdLst>
     <p:sldId id="256" r:id="rId2"/>
+    <p:sldId id="257" r:id="rId3"/>
+    <p:sldId id="258" r:id="rId4"/>
+    <p:sldId id="259" r:id="rId5"/>
   </p:sldIdLst>
   <p:sldSz cx="12192000" cy="6858000"/>
   <p:notesSz cx="6858000" cy="9144000"/>
@@ -104,7 +107,975 @@
       </a:defRPr>
     </a:lvl9pPr>
   </p:defaultTextStyle>
+  <p:extLst>
+    <p:ext uri="{EFAFB233-063F-42B5-8137-9DF3F51BA10A}">
+      <p15:sldGuideLst xmlns:p15="http://schemas.microsoft.com/office/powerpoint/2012/main"/>
+    </p:ext>
+  </p:extLst>
 </p:presentation>
+</file>
+
+<file path=ppt/revisionInfo.xml><?xml version="1.0" encoding="utf-8"?>
+<p1510:revInfo xmlns:a="http://schemas.openxmlformats.org/drawingml/2006/main" xmlns:r="http://schemas.openxmlformats.org/officeDocument/2006/relationships" xmlns:p1510="http://schemas.microsoft.com/office/powerpoint/2015/10/main">
+  <p1510:revLst>
+    <p1510:client id="{FBDF43B3-F54B-4170-B031-B3017B7EDAA2}" v="67" dt="2023-06-05T12:25:58.004"/>
+  </p1510:revLst>
+</p1510:revInfo>
+</file>
+
+<file path=ppt/changesInfos/changesInfo1.xml><?xml version="1.0" encoding="utf-8"?>
+<pc:chgInfo xmlns:a="http://schemas.openxmlformats.org/drawingml/2006/main" xmlns:r="http://schemas.openxmlformats.org/officeDocument/2006/relationships" xmlns:ac="http://schemas.microsoft.com/office/drawing/2013/main/command" xmlns:pc="http://schemas.microsoft.com/office/powerpoint/2013/main/command">
+  <pc:docChgLst>
+    <pc:chgData name="Laurits Wieslander Lyngbæk" userId="5b145d83-88ad-4e24-ae77-3c6a2a84db4d" providerId="ADAL" clId="{FBDF43B3-F54B-4170-B031-B3017B7EDAA2}"/>
+    <pc:docChg chg="undo redo custSel addSld modSld">
+      <pc:chgData name="Laurits Wieslander Lyngbæk" userId="5b145d83-88ad-4e24-ae77-3c6a2a84db4d" providerId="ADAL" clId="{FBDF43B3-F54B-4170-B031-B3017B7EDAA2}" dt="2023-06-05T12:26:41.633" v="654" actId="1076"/>
+      <pc:docMkLst>
+        <pc:docMk/>
+      </pc:docMkLst>
+      <pc:sldChg chg="addSp delSp modSp new mod">
+        <pc:chgData name="Laurits Wieslander Lyngbæk" userId="5b145d83-88ad-4e24-ae77-3c6a2a84db4d" providerId="ADAL" clId="{FBDF43B3-F54B-4170-B031-B3017B7EDAA2}" dt="2023-06-05T12:20:39.335" v="515" actId="1076"/>
+        <pc:sldMkLst>
+          <pc:docMk/>
+          <pc:sldMk cId="2944737114" sldId="257"/>
+        </pc:sldMkLst>
+        <pc:spChg chg="del">
+          <ac:chgData name="Laurits Wieslander Lyngbæk" userId="5b145d83-88ad-4e24-ae77-3c6a2a84db4d" providerId="ADAL" clId="{FBDF43B3-F54B-4170-B031-B3017B7EDAA2}" dt="2023-06-05T10:51:33.822" v="1" actId="478"/>
+          <ac:spMkLst>
+            <pc:docMk/>
+            <pc:sldMk cId="2944737114" sldId="257"/>
+            <ac:spMk id="2" creationId="{CEE55BB3-4DEC-7F3C-88C7-0BC3B4E35B86}"/>
+          </ac:spMkLst>
+        </pc:spChg>
+        <pc:spChg chg="del">
+          <ac:chgData name="Laurits Wieslander Lyngbæk" userId="5b145d83-88ad-4e24-ae77-3c6a2a84db4d" providerId="ADAL" clId="{FBDF43B3-F54B-4170-B031-B3017B7EDAA2}" dt="2023-06-05T10:59:09.786" v="2" actId="478"/>
+          <ac:spMkLst>
+            <pc:docMk/>
+            <pc:sldMk cId="2944737114" sldId="257"/>
+            <ac:spMk id="3" creationId="{F2A96FCA-466B-AF0D-D9F6-C85B4CA30AE3}"/>
+          </ac:spMkLst>
+        </pc:spChg>
+        <pc:spChg chg="add mod">
+          <ac:chgData name="Laurits Wieslander Lyngbæk" userId="5b145d83-88ad-4e24-ae77-3c6a2a84db4d" providerId="ADAL" clId="{FBDF43B3-F54B-4170-B031-B3017B7EDAA2}" dt="2023-06-05T11:15:41.081" v="171" actId="1076"/>
+          <ac:spMkLst>
+            <pc:docMk/>
+            <pc:sldMk cId="2944737114" sldId="257"/>
+            <ac:spMk id="8" creationId="{4F00BCB7-F445-D0C6-FC29-607084F9B2C3}"/>
+          </ac:spMkLst>
+        </pc:spChg>
+        <pc:spChg chg="add mod topLvl">
+          <ac:chgData name="Laurits Wieslander Lyngbæk" userId="5b145d83-88ad-4e24-ae77-3c6a2a84db4d" providerId="ADAL" clId="{FBDF43B3-F54B-4170-B031-B3017B7EDAA2}" dt="2023-06-05T12:20:26.528" v="512" actId="1076"/>
+          <ac:spMkLst>
+            <pc:docMk/>
+            <pc:sldMk cId="2944737114" sldId="257"/>
+            <ac:spMk id="12" creationId="{E21A7FB1-71DB-7C90-2144-7E1BFAEB647F}"/>
+          </ac:spMkLst>
+        </pc:spChg>
+        <pc:spChg chg="add del mod">
+          <ac:chgData name="Laurits Wieslander Lyngbæk" userId="5b145d83-88ad-4e24-ae77-3c6a2a84db4d" providerId="ADAL" clId="{FBDF43B3-F54B-4170-B031-B3017B7EDAA2}" dt="2023-06-05T11:10:25.735" v="41" actId="478"/>
+          <ac:spMkLst>
+            <pc:docMk/>
+            <pc:sldMk cId="2944737114" sldId="257"/>
+            <ac:spMk id="13" creationId="{CE6173C3-CCF2-EB69-45B8-D98FCB3B7312}"/>
+          </ac:spMkLst>
+        </pc:spChg>
+        <pc:spChg chg="add del mod">
+          <ac:chgData name="Laurits Wieslander Lyngbæk" userId="5b145d83-88ad-4e24-ae77-3c6a2a84db4d" providerId="ADAL" clId="{FBDF43B3-F54B-4170-B031-B3017B7EDAA2}" dt="2023-06-05T11:12:42.765" v="91" actId="21"/>
+          <ac:spMkLst>
+            <pc:docMk/>
+            <pc:sldMk cId="2944737114" sldId="257"/>
+            <ac:spMk id="17" creationId="{A2C54D0E-3514-E4FB-E359-10D5B249AA86}"/>
+          </ac:spMkLst>
+        </pc:spChg>
+        <pc:spChg chg="add mod topLvl">
+          <ac:chgData name="Laurits Wieslander Lyngbæk" userId="5b145d83-88ad-4e24-ae77-3c6a2a84db4d" providerId="ADAL" clId="{FBDF43B3-F54B-4170-B031-B3017B7EDAA2}" dt="2023-06-05T11:17:20.956" v="251" actId="688"/>
+          <ac:spMkLst>
+            <pc:docMk/>
+            <pc:sldMk cId="2944737114" sldId="257"/>
+            <ac:spMk id="18" creationId="{2DF4A6BB-4BF0-8690-18F4-00813C66B55B}"/>
+          </ac:spMkLst>
+        </pc:spChg>
+        <pc:spChg chg="add del mod topLvl">
+          <ac:chgData name="Laurits Wieslander Lyngbæk" userId="5b145d83-88ad-4e24-ae77-3c6a2a84db4d" providerId="ADAL" clId="{FBDF43B3-F54B-4170-B031-B3017B7EDAA2}" dt="2023-06-05T12:20:22.315" v="511" actId="478"/>
+          <ac:spMkLst>
+            <pc:docMk/>
+            <pc:sldMk cId="2944737114" sldId="257"/>
+            <ac:spMk id="19" creationId="{5B1B172A-5D41-C8FF-26E0-94FE61C2564A}"/>
+          </ac:spMkLst>
+        </pc:spChg>
+        <pc:spChg chg="add mod topLvl">
+          <ac:chgData name="Laurits Wieslander Lyngbæk" userId="5b145d83-88ad-4e24-ae77-3c6a2a84db4d" providerId="ADAL" clId="{FBDF43B3-F54B-4170-B031-B3017B7EDAA2}" dt="2023-06-05T12:20:33.585" v="513" actId="1076"/>
+          <ac:spMkLst>
+            <pc:docMk/>
+            <pc:sldMk cId="2944737114" sldId="257"/>
+            <ac:spMk id="21" creationId="{9EAEA5DC-975D-DD85-4036-5939F9286BE2}"/>
+          </ac:spMkLst>
+        </pc:spChg>
+        <pc:spChg chg="add mod topLvl">
+          <ac:chgData name="Laurits Wieslander Lyngbæk" userId="5b145d83-88ad-4e24-ae77-3c6a2a84db4d" providerId="ADAL" clId="{FBDF43B3-F54B-4170-B031-B3017B7EDAA2}" dt="2023-06-05T12:20:33.585" v="513" actId="1076"/>
+          <ac:spMkLst>
+            <pc:docMk/>
+            <pc:sldMk cId="2944737114" sldId="257"/>
+            <ac:spMk id="22" creationId="{10C2D934-DF2E-EBFF-B0C7-B3487F840121}"/>
+          </ac:spMkLst>
+        </pc:spChg>
+        <pc:spChg chg="add mod">
+          <ac:chgData name="Laurits Wieslander Lyngbæk" userId="5b145d83-88ad-4e24-ae77-3c6a2a84db4d" providerId="ADAL" clId="{FBDF43B3-F54B-4170-B031-B3017B7EDAA2}" dt="2023-06-05T12:19:40.581" v="505" actId="14100"/>
+          <ac:spMkLst>
+            <pc:docMk/>
+            <pc:sldMk cId="2944737114" sldId="257"/>
+            <ac:spMk id="26" creationId="{1AFC657B-E195-454B-8352-20FF4E72A776}"/>
+          </ac:spMkLst>
+        </pc:spChg>
+        <pc:spChg chg="add mod">
+          <ac:chgData name="Laurits Wieslander Lyngbæk" userId="5b145d83-88ad-4e24-ae77-3c6a2a84db4d" providerId="ADAL" clId="{FBDF43B3-F54B-4170-B031-B3017B7EDAA2}" dt="2023-06-05T12:20:39.335" v="515" actId="1076"/>
+          <ac:spMkLst>
+            <pc:docMk/>
+            <pc:sldMk cId="2944737114" sldId="257"/>
+            <ac:spMk id="27" creationId="{C8777E9D-1C0F-5250-8C02-193D7CB49507}"/>
+          </ac:spMkLst>
+        </pc:spChg>
+        <pc:spChg chg="add del mod">
+          <ac:chgData name="Laurits Wieslander Lyngbæk" userId="5b145d83-88ad-4e24-ae77-3c6a2a84db4d" providerId="ADAL" clId="{FBDF43B3-F54B-4170-B031-B3017B7EDAA2}" dt="2023-06-05T12:19:09.246" v="436" actId="478"/>
+          <ac:spMkLst>
+            <pc:docMk/>
+            <pc:sldMk cId="2944737114" sldId="257"/>
+            <ac:spMk id="28" creationId="{033B716D-7495-898B-6A7A-2B12D91E6E3C}"/>
+          </ac:spMkLst>
+        </pc:spChg>
+        <pc:spChg chg="add del mod">
+          <ac:chgData name="Laurits Wieslander Lyngbæk" userId="5b145d83-88ad-4e24-ae77-3c6a2a84db4d" providerId="ADAL" clId="{FBDF43B3-F54B-4170-B031-B3017B7EDAA2}" dt="2023-06-05T11:20:26.902" v="284" actId="478"/>
+          <ac:spMkLst>
+            <pc:docMk/>
+            <pc:sldMk cId="2944737114" sldId="257"/>
+            <ac:spMk id="35" creationId="{23CCA6E2-593A-92B6-9723-1CCE486093BE}"/>
+          </ac:spMkLst>
+        </pc:spChg>
+        <pc:spChg chg="add mod">
+          <ac:chgData name="Laurits Wieslander Lyngbæk" userId="5b145d83-88ad-4e24-ae77-3c6a2a84db4d" providerId="ADAL" clId="{FBDF43B3-F54B-4170-B031-B3017B7EDAA2}" dt="2023-06-05T11:19:48.080" v="281" actId="571"/>
+          <ac:spMkLst>
+            <pc:docMk/>
+            <pc:sldMk cId="2944737114" sldId="257"/>
+            <ac:spMk id="36" creationId="{B274DCEE-4F9E-24A4-61AC-FCA59BCB0AC4}"/>
+          </ac:spMkLst>
+        </pc:spChg>
+        <pc:grpChg chg="add del mod">
+          <ac:chgData name="Laurits Wieslander Lyngbæk" userId="5b145d83-88ad-4e24-ae77-3c6a2a84db4d" providerId="ADAL" clId="{FBDF43B3-F54B-4170-B031-B3017B7EDAA2}" dt="2023-06-05T11:17:18.595" v="250" actId="165"/>
+          <ac:grpSpMkLst>
+            <pc:docMk/>
+            <pc:sldMk cId="2944737114" sldId="257"/>
+            <ac:grpSpMk id="20" creationId="{03796B68-C090-7620-5421-272106123D0D}"/>
+          </ac:grpSpMkLst>
+        </pc:grpChg>
+        <pc:grpChg chg="add del mod">
+          <ac:chgData name="Laurits Wieslander Lyngbæk" userId="5b145d83-88ad-4e24-ae77-3c6a2a84db4d" providerId="ADAL" clId="{FBDF43B3-F54B-4170-B031-B3017B7EDAA2}" dt="2023-06-05T12:20:16.230" v="510" actId="165"/>
+          <ac:grpSpMkLst>
+            <pc:docMk/>
+            <pc:sldMk cId="2944737114" sldId="257"/>
+            <ac:grpSpMk id="23" creationId="{003112AD-B1F5-1022-E12A-0312CAB03031}"/>
+          </ac:grpSpMkLst>
+        </pc:grpChg>
+        <pc:picChg chg="add mod">
+          <ac:chgData name="Laurits Wieslander Lyngbæk" userId="5b145d83-88ad-4e24-ae77-3c6a2a84db4d" providerId="ADAL" clId="{FBDF43B3-F54B-4170-B031-B3017B7EDAA2}" dt="2023-06-05T12:19:47.222" v="507" actId="571"/>
+          <ac:picMkLst>
+            <pc:docMk/>
+            <pc:sldMk cId="2944737114" sldId="257"/>
+            <ac:picMk id="2" creationId="{43DFA198-7A4E-8A05-0295-89695DF24CE7}"/>
+          </ac:picMkLst>
+        </pc:picChg>
+        <pc:picChg chg="add mod topLvl">
+          <ac:chgData name="Laurits Wieslander Lyngbæk" userId="5b145d83-88ad-4e24-ae77-3c6a2a84db4d" providerId="ADAL" clId="{FBDF43B3-F54B-4170-B031-B3017B7EDAA2}" dt="2023-06-05T11:17:25.890" v="252" actId="688"/>
+          <ac:picMkLst>
+            <pc:docMk/>
+            <pc:sldMk cId="2944737114" sldId="257"/>
+            <ac:picMk id="9" creationId="{3C8725EC-8671-9677-65B5-CD5FB002E0E9}"/>
+          </ac:picMkLst>
+        </pc:picChg>
+        <pc:picChg chg="add mod">
+          <ac:chgData name="Laurits Wieslander Lyngbæk" userId="5b145d83-88ad-4e24-ae77-3c6a2a84db4d" providerId="ADAL" clId="{FBDF43B3-F54B-4170-B031-B3017B7EDAA2}" dt="2023-06-05T12:20:36.143" v="514" actId="1076"/>
+          <ac:picMkLst>
+            <pc:docMk/>
+            <pc:sldMk cId="2944737114" sldId="257"/>
+            <ac:picMk id="11" creationId="{2AB1FB0B-6E64-BBF4-652A-857C98368146}"/>
+          </ac:picMkLst>
+        </pc:picChg>
+        <pc:cxnChg chg="add mod">
+          <ac:chgData name="Laurits Wieslander Lyngbæk" userId="5b145d83-88ad-4e24-ae77-3c6a2a84db4d" providerId="ADAL" clId="{FBDF43B3-F54B-4170-B031-B3017B7EDAA2}" dt="2023-06-05T11:15:37.002" v="170" actId="1076"/>
+          <ac:cxnSpMkLst>
+            <pc:docMk/>
+            <pc:sldMk cId="2944737114" sldId="257"/>
+            <ac:cxnSpMk id="5" creationId="{A160E844-882E-D85A-A3E6-361794AE4ABD}"/>
+          </ac:cxnSpMkLst>
+        </pc:cxnChg>
+        <pc:cxnChg chg="add del mod">
+          <ac:chgData name="Laurits Wieslander Lyngbæk" userId="5b145d83-88ad-4e24-ae77-3c6a2a84db4d" providerId="ADAL" clId="{FBDF43B3-F54B-4170-B031-B3017B7EDAA2}" dt="2023-06-05T11:18:35.459" v="272" actId="11529"/>
+          <ac:cxnSpMkLst>
+            <pc:docMk/>
+            <pc:sldMk cId="2944737114" sldId="257"/>
+            <ac:cxnSpMk id="30" creationId="{64347E14-8366-7451-1A76-9CD910F2D10F}"/>
+          </ac:cxnSpMkLst>
+        </pc:cxnChg>
+      </pc:sldChg>
+      <pc:sldChg chg="addSp delSp modSp new mod">
+        <pc:chgData name="Laurits Wieslander Lyngbæk" userId="5b145d83-88ad-4e24-ae77-3c6a2a84db4d" providerId="ADAL" clId="{FBDF43B3-F54B-4170-B031-B3017B7EDAA2}" dt="2023-06-05T12:26:02.300" v="640" actId="1076"/>
+        <pc:sldMkLst>
+          <pc:docMk/>
+          <pc:sldMk cId="690076262" sldId="258"/>
+        </pc:sldMkLst>
+        <pc:spChg chg="del">
+          <ac:chgData name="Laurits Wieslander Lyngbæk" userId="5b145d83-88ad-4e24-ae77-3c6a2a84db4d" providerId="ADAL" clId="{FBDF43B3-F54B-4170-B031-B3017B7EDAA2}" dt="2023-06-05T11:20:54.179" v="286" actId="478"/>
+          <ac:spMkLst>
+            <pc:docMk/>
+            <pc:sldMk cId="690076262" sldId="258"/>
+            <ac:spMk id="2" creationId="{AD4FD5F3-4621-5F9E-5300-46CADF579A8F}"/>
+          </ac:spMkLst>
+        </pc:spChg>
+        <pc:spChg chg="add mod">
+          <ac:chgData name="Laurits Wieslander Lyngbæk" userId="5b145d83-88ad-4e24-ae77-3c6a2a84db4d" providerId="ADAL" clId="{FBDF43B3-F54B-4170-B031-B3017B7EDAA2}" dt="2023-06-05T12:24:44.204" v="584" actId="14100"/>
+          <ac:spMkLst>
+            <pc:docMk/>
+            <pc:sldMk cId="690076262" sldId="258"/>
+            <ac:spMk id="2" creationId="{BFB8B71D-C851-01AC-0AA9-78AEB03B8F5E}"/>
+          </ac:spMkLst>
+        </pc:spChg>
+        <pc:spChg chg="add mod">
+          <ac:chgData name="Laurits Wieslander Lyngbæk" userId="5b145d83-88ad-4e24-ae77-3c6a2a84db4d" providerId="ADAL" clId="{FBDF43B3-F54B-4170-B031-B3017B7EDAA2}" dt="2023-06-05T12:25:04.932" v="589" actId="1076"/>
+          <ac:spMkLst>
+            <pc:docMk/>
+            <pc:sldMk cId="690076262" sldId="258"/>
+            <ac:spMk id="3" creationId="{0798F4A2-54CD-A676-4DB9-5AB538FD722A}"/>
+          </ac:spMkLst>
+        </pc:spChg>
+        <pc:spChg chg="del">
+          <ac:chgData name="Laurits Wieslander Lyngbæk" userId="5b145d83-88ad-4e24-ae77-3c6a2a84db4d" providerId="ADAL" clId="{FBDF43B3-F54B-4170-B031-B3017B7EDAA2}" dt="2023-06-05T11:20:55.715" v="287" actId="478"/>
+          <ac:spMkLst>
+            <pc:docMk/>
+            <pc:sldMk cId="690076262" sldId="258"/>
+            <ac:spMk id="3" creationId="{280A58C8-AEE6-1E5D-42EE-9EC5BC24D9FF}"/>
+          </ac:spMkLst>
+        </pc:spChg>
+        <pc:spChg chg="add mod">
+          <ac:chgData name="Laurits Wieslander Lyngbæk" userId="5b145d83-88ad-4e24-ae77-3c6a2a84db4d" providerId="ADAL" clId="{FBDF43B3-F54B-4170-B031-B3017B7EDAA2}" dt="2023-06-05T12:24:54.048" v="586" actId="1076"/>
+          <ac:spMkLst>
+            <pc:docMk/>
+            <pc:sldMk cId="690076262" sldId="258"/>
+            <ac:spMk id="4" creationId="{A8EC2CA9-0E78-718A-9A62-B450A6F4E0AB}"/>
+          </ac:spMkLst>
+        </pc:spChg>
+        <pc:spChg chg="add mod">
+          <ac:chgData name="Laurits Wieslander Lyngbæk" userId="5b145d83-88ad-4e24-ae77-3c6a2a84db4d" providerId="ADAL" clId="{FBDF43B3-F54B-4170-B031-B3017B7EDAA2}" dt="2023-06-05T12:25:13.237" v="591" actId="1076"/>
+          <ac:spMkLst>
+            <pc:docMk/>
+            <pc:sldMk cId="690076262" sldId="258"/>
+            <ac:spMk id="5" creationId="{B4BBE839-6769-E22A-138C-1371C3B8326D}"/>
+          </ac:spMkLst>
+        </pc:spChg>
+        <pc:spChg chg="add del mod">
+          <ac:chgData name="Laurits Wieslander Lyngbæk" userId="5b145d83-88ad-4e24-ae77-3c6a2a84db4d" providerId="ADAL" clId="{FBDF43B3-F54B-4170-B031-B3017B7EDAA2}" dt="2023-06-05T11:23:02.327" v="316" actId="478"/>
+          <ac:spMkLst>
+            <pc:docMk/>
+            <pc:sldMk cId="690076262" sldId="258"/>
+            <ac:spMk id="5" creationId="{B724B0EA-8698-7E5E-F2B1-BDE502E04DBC}"/>
+          </ac:spMkLst>
+        </pc:spChg>
+        <pc:spChg chg="add mod">
+          <ac:chgData name="Laurits Wieslander Lyngbæk" userId="5b145d83-88ad-4e24-ae77-3c6a2a84db4d" providerId="ADAL" clId="{FBDF43B3-F54B-4170-B031-B3017B7EDAA2}" dt="2023-06-05T12:25:32.223" v="610" actId="1036"/>
+          <ac:spMkLst>
+            <pc:docMk/>
+            <pc:sldMk cId="690076262" sldId="258"/>
+            <ac:spMk id="6" creationId="{535096B2-3E0E-81FF-9691-56C3F226281C}"/>
+          </ac:spMkLst>
+        </pc:spChg>
+        <pc:spChg chg="add del mod">
+          <ac:chgData name="Laurits Wieslander Lyngbæk" userId="5b145d83-88ad-4e24-ae77-3c6a2a84db4d" providerId="ADAL" clId="{FBDF43B3-F54B-4170-B031-B3017B7EDAA2}" dt="2023-06-05T12:25:46.505" v="629" actId="1035"/>
+          <ac:spMkLst>
+            <pc:docMk/>
+            <pc:sldMk cId="690076262" sldId="258"/>
+            <ac:spMk id="7" creationId="{0737BAF0-51C4-B386-E303-5E6176AD00B0}"/>
+          </ac:spMkLst>
+        </pc:spChg>
+        <pc:spChg chg="add mod">
+          <ac:chgData name="Laurits Wieslander Lyngbæk" userId="5b145d83-88ad-4e24-ae77-3c6a2a84db4d" providerId="ADAL" clId="{FBDF43B3-F54B-4170-B031-B3017B7EDAA2}" dt="2023-06-05T12:25:55.927" v="638" actId="1038"/>
+          <ac:spMkLst>
+            <pc:docMk/>
+            <pc:sldMk cId="690076262" sldId="258"/>
+            <ac:spMk id="8" creationId="{1E3C6001-90F3-EDD0-1980-D624E725DB55}"/>
+          </ac:spMkLst>
+        </pc:spChg>
+        <pc:spChg chg="add mod">
+          <ac:chgData name="Laurits Wieslander Lyngbæk" userId="5b145d83-88ad-4e24-ae77-3c6a2a84db4d" providerId="ADAL" clId="{FBDF43B3-F54B-4170-B031-B3017B7EDAA2}" dt="2023-06-05T11:23:21.474" v="320" actId="164"/>
+          <ac:spMkLst>
+            <pc:docMk/>
+            <pc:sldMk cId="690076262" sldId="258"/>
+            <ac:spMk id="8" creationId="{9D487794-03CC-93FD-6BAB-5057631E711C}"/>
+          </ac:spMkLst>
+        </pc:spChg>
+        <pc:spChg chg="add mod">
+          <ac:chgData name="Laurits Wieslander Lyngbæk" userId="5b145d83-88ad-4e24-ae77-3c6a2a84db4d" providerId="ADAL" clId="{FBDF43B3-F54B-4170-B031-B3017B7EDAA2}" dt="2023-06-05T12:26:02.300" v="640" actId="1076"/>
+          <ac:spMkLst>
+            <pc:docMk/>
+            <pc:sldMk cId="690076262" sldId="258"/>
+            <ac:spMk id="9" creationId="{9CE5337B-366D-83A4-6BA7-2A4415B4B3C0}"/>
+          </ac:spMkLst>
+        </pc:spChg>
+        <pc:spChg chg="mod">
+          <ac:chgData name="Laurits Wieslander Lyngbæk" userId="5b145d83-88ad-4e24-ae77-3c6a2a84db4d" providerId="ADAL" clId="{FBDF43B3-F54B-4170-B031-B3017B7EDAA2}" dt="2023-06-05T11:20:56.173" v="288"/>
+          <ac:spMkLst>
+            <pc:docMk/>
+            <pc:sldMk cId="690076262" sldId="258"/>
+            <ac:spMk id="10" creationId="{BBEF2059-B672-DCB6-A45C-9E4D7AA6AF63}"/>
+          </ac:spMkLst>
+        </pc:spChg>
+        <pc:spChg chg="mod">
+          <ac:chgData name="Laurits Wieslander Lyngbæk" userId="5b145d83-88ad-4e24-ae77-3c6a2a84db4d" providerId="ADAL" clId="{FBDF43B3-F54B-4170-B031-B3017B7EDAA2}" dt="2023-06-05T11:20:56.173" v="288"/>
+          <ac:spMkLst>
+            <pc:docMk/>
+            <pc:sldMk cId="690076262" sldId="258"/>
+            <ac:spMk id="11" creationId="{510A47B7-A371-378C-67BC-153A1218D0BF}"/>
+          </ac:spMkLst>
+        </pc:spChg>
+        <pc:spChg chg="mod">
+          <ac:chgData name="Laurits Wieslander Lyngbæk" userId="5b145d83-88ad-4e24-ae77-3c6a2a84db4d" providerId="ADAL" clId="{FBDF43B3-F54B-4170-B031-B3017B7EDAA2}" dt="2023-06-05T11:20:56.173" v="288"/>
+          <ac:spMkLst>
+            <pc:docMk/>
+            <pc:sldMk cId="690076262" sldId="258"/>
+            <ac:spMk id="12" creationId="{C09B56EB-7A5B-4063-B6ED-CCE0E585D48C}"/>
+          </ac:spMkLst>
+        </pc:spChg>
+        <pc:spChg chg="mod">
+          <ac:chgData name="Laurits Wieslander Lyngbæk" userId="5b145d83-88ad-4e24-ae77-3c6a2a84db4d" providerId="ADAL" clId="{FBDF43B3-F54B-4170-B031-B3017B7EDAA2}" dt="2023-06-05T11:20:56.173" v="288"/>
+          <ac:spMkLst>
+            <pc:docMk/>
+            <pc:sldMk cId="690076262" sldId="258"/>
+            <ac:spMk id="13" creationId="{F053AE89-0CBA-434A-CD18-74FC84CF4542}"/>
+          </ac:spMkLst>
+        </pc:spChg>
+        <pc:spChg chg="add del mod">
+          <ac:chgData name="Laurits Wieslander Lyngbæk" userId="5b145d83-88ad-4e24-ae77-3c6a2a84db4d" providerId="ADAL" clId="{FBDF43B3-F54B-4170-B031-B3017B7EDAA2}" dt="2023-06-05T11:21:02.506" v="291" actId="478"/>
+          <ac:spMkLst>
+            <pc:docMk/>
+            <pc:sldMk cId="690076262" sldId="258"/>
+            <ac:spMk id="14" creationId="{12D2F2BF-AD89-8028-EA57-1797986F0E45}"/>
+          </ac:spMkLst>
+        </pc:spChg>
+        <pc:spChg chg="add del mod">
+          <ac:chgData name="Laurits Wieslander Lyngbæk" userId="5b145d83-88ad-4e24-ae77-3c6a2a84db4d" providerId="ADAL" clId="{FBDF43B3-F54B-4170-B031-B3017B7EDAA2}" dt="2023-06-05T11:21:05.175" v="292" actId="478"/>
+          <ac:spMkLst>
+            <pc:docMk/>
+            <pc:sldMk cId="690076262" sldId="258"/>
+            <ac:spMk id="15" creationId="{464D5FA6-859E-6A94-B6F1-F19B2EA37024}"/>
+          </ac:spMkLst>
+        </pc:spChg>
+        <pc:spChg chg="add del mod">
+          <ac:chgData name="Laurits Wieslander Lyngbæk" userId="5b145d83-88ad-4e24-ae77-3c6a2a84db4d" providerId="ADAL" clId="{FBDF43B3-F54B-4170-B031-B3017B7EDAA2}" dt="2023-06-05T11:21:00.601" v="289" actId="478"/>
+          <ac:spMkLst>
+            <pc:docMk/>
+            <pc:sldMk cId="690076262" sldId="258"/>
+            <ac:spMk id="16" creationId="{9DFFA0D0-5BC5-673C-5C07-43987DDE8249}"/>
+          </ac:spMkLst>
+        </pc:spChg>
+        <pc:spChg chg="add del mod">
+          <ac:chgData name="Laurits Wieslander Lyngbæk" userId="5b145d83-88ad-4e24-ae77-3c6a2a84db4d" providerId="ADAL" clId="{FBDF43B3-F54B-4170-B031-B3017B7EDAA2}" dt="2023-06-05T11:21:13.515" v="294"/>
+          <ac:spMkLst>
+            <pc:docMk/>
+            <pc:sldMk cId="690076262" sldId="258"/>
+            <ac:spMk id="18" creationId="{3584EFDA-091B-196F-74B4-BAAD74A9AC1E}"/>
+          </ac:spMkLst>
+        </pc:spChg>
+        <pc:spChg chg="add del mod">
+          <ac:chgData name="Laurits Wieslander Lyngbæk" userId="5b145d83-88ad-4e24-ae77-3c6a2a84db4d" providerId="ADAL" clId="{FBDF43B3-F54B-4170-B031-B3017B7EDAA2}" dt="2023-06-05T11:21:13.515" v="294"/>
+          <ac:spMkLst>
+            <pc:docMk/>
+            <pc:sldMk cId="690076262" sldId="258"/>
+            <ac:spMk id="21" creationId="{5B78BBBE-BD7D-D30D-4972-B564BED72E35}"/>
+          </ac:spMkLst>
+        </pc:spChg>
+        <pc:spChg chg="mod">
+          <ac:chgData name="Laurits Wieslander Lyngbæk" userId="5b145d83-88ad-4e24-ae77-3c6a2a84db4d" providerId="ADAL" clId="{FBDF43B3-F54B-4170-B031-B3017B7EDAA2}" dt="2023-06-05T11:21:11.471" v="293"/>
+          <ac:spMkLst>
+            <pc:docMk/>
+            <pc:sldMk cId="690076262" sldId="258"/>
+            <ac:spMk id="23" creationId="{F8358CCF-385A-5EA1-AD9F-EC5F4C6C4529}"/>
+          </ac:spMkLst>
+        </pc:spChg>
+        <pc:spChg chg="mod">
+          <ac:chgData name="Laurits Wieslander Lyngbæk" userId="5b145d83-88ad-4e24-ae77-3c6a2a84db4d" providerId="ADAL" clId="{FBDF43B3-F54B-4170-B031-B3017B7EDAA2}" dt="2023-06-05T11:21:11.471" v="293"/>
+          <ac:spMkLst>
+            <pc:docMk/>
+            <pc:sldMk cId="690076262" sldId="258"/>
+            <ac:spMk id="24" creationId="{78FC0812-94F6-0227-AF46-87A545223612}"/>
+          </ac:spMkLst>
+        </pc:spChg>
+        <pc:spChg chg="mod">
+          <ac:chgData name="Laurits Wieslander Lyngbæk" userId="5b145d83-88ad-4e24-ae77-3c6a2a84db4d" providerId="ADAL" clId="{FBDF43B3-F54B-4170-B031-B3017B7EDAA2}" dt="2023-06-05T11:21:11.471" v="293"/>
+          <ac:spMkLst>
+            <pc:docMk/>
+            <pc:sldMk cId="690076262" sldId="258"/>
+            <ac:spMk id="25" creationId="{F7AD1E8B-2076-5711-67E5-97ABDE169672}"/>
+          </ac:spMkLst>
+        </pc:spChg>
+        <pc:spChg chg="mod">
+          <ac:chgData name="Laurits Wieslander Lyngbæk" userId="5b145d83-88ad-4e24-ae77-3c6a2a84db4d" providerId="ADAL" clId="{FBDF43B3-F54B-4170-B031-B3017B7EDAA2}" dt="2023-06-05T11:21:11.471" v="293"/>
+          <ac:spMkLst>
+            <pc:docMk/>
+            <pc:sldMk cId="690076262" sldId="258"/>
+            <ac:spMk id="26" creationId="{1B41AC43-78A5-A7FA-BD0E-4B2CF6219314}"/>
+          </ac:spMkLst>
+        </pc:spChg>
+        <pc:spChg chg="add del mod">
+          <ac:chgData name="Laurits Wieslander Lyngbæk" userId="5b145d83-88ad-4e24-ae77-3c6a2a84db4d" providerId="ADAL" clId="{FBDF43B3-F54B-4170-B031-B3017B7EDAA2}" dt="2023-06-05T11:22:59.628" v="315" actId="478"/>
+          <ac:spMkLst>
+            <pc:docMk/>
+            <pc:sldMk cId="690076262" sldId="258"/>
+            <ac:spMk id="28" creationId="{5142D657-5C0F-DF71-68AA-C0D54A5EBCA5}"/>
+          </ac:spMkLst>
+        </pc:spChg>
+        <pc:spChg chg="add mod">
+          <ac:chgData name="Laurits Wieslander Lyngbæk" userId="5b145d83-88ad-4e24-ae77-3c6a2a84db4d" providerId="ADAL" clId="{FBDF43B3-F54B-4170-B031-B3017B7EDAA2}" dt="2023-06-05T11:23:25.782" v="321" actId="164"/>
+          <ac:spMkLst>
+            <pc:docMk/>
+            <pc:sldMk cId="690076262" sldId="258"/>
+            <ac:spMk id="31" creationId="{3CB5A5EE-BDB2-0258-137C-81ECC9CFEBDA}"/>
+          </ac:spMkLst>
+        </pc:spChg>
+        <pc:spChg chg="mod">
+          <ac:chgData name="Laurits Wieslander Lyngbæk" userId="5b145d83-88ad-4e24-ae77-3c6a2a84db4d" providerId="ADAL" clId="{FBDF43B3-F54B-4170-B031-B3017B7EDAA2}" dt="2023-06-05T11:21:18.326" v="295"/>
+          <ac:spMkLst>
+            <pc:docMk/>
+            <pc:sldMk cId="690076262" sldId="258"/>
+            <ac:spMk id="33" creationId="{2DA3AACE-165C-1E60-9E44-E564F98B326D}"/>
+          </ac:spMkLst>
+        </pc:spChg>
+        <pc:spChg chg="mod">
+          <ac:chgData name="Laurits Wieslander Lyngbæk" userId="5b145d83-88ad-4e24-ae77-3c6a2a84db4d" providerId="ADAL" clId="{FBDF43B3-F54B-4170-B031-B3017B7EDAA2}" dt="2023-06-05T11:21:18.326" v="295"/>
+          <ac:spMkLst>
+            <pc:docMk/>
+            <pc:sldMk cId="690076262" sldId="258"/>
+            <ac:spMk id="34" creationId="{01F4E4BE-B914-B85D-247A-49123BDFEB71}"/>
+          </ac:spMkLst>
+        </pc:spChg>
+        <pc:spChg chg="mod">
+          <ac:chgData name="Laurits Wieslander Lyngbæk" userId="5b145d83-88ad-4e24-ae77-3c6a2a84db4d" providerId="ADAL" clId="{FBDF43B3-F54B-4170-B031-B3017B7EDAA2}" dt="2023-06-05T11:21:18.326" v="295"/>
+          <ac:spMkLst>
+            <pc:docMk/>
+            <pc:sldMk cId="690076262" sldId="258"/>
+            <ac:spMk id="35" creationId="{4E12B964-B436-720D-CC5D-CBF6F4F10D26}"/>
+          </ac:spMkLst>
+        </pc:spChg>
+        <pc:spChg chg="mod">
+          <ac:chgData name="Laurits Wieslander Lyngbæk" userId="5b145d83-88ad-4e24-ae77-3c6a2a84db4d" providerId="ADAL" clId="{FBDF43B3-F54B-4170-B031-B3017B7EDAA2}" dt="2023-06-05T11:21:18.326" v="295"/>
+          <ac:spMkLst>
+            <pc:docMk/>
+            <pc:sldMk cId="690076262" sldId="258"/>
+            <ac:spMk id="36" creationId="{208A0B40-2642-8A7B-2E97-5A2B4149FD03}"/>
+          </ac:spMkLst>
+        </pc:spChg>
+        <pc:spChg chg="add del mod">
+          <ac:chgData name="Laurits Wieslander Lyngbæk" userId="5b145d83-88ad-4e24-ae77-3c6a2a84db4d" providerId="ADAL" clId="{FBDF43B3-F54B-4170-B031-B3017B7EDAA2}" dt="2023-06-05T11:21:24.450" v="300"/>
+          <ac:spMkLst>
+            <pc:docMk/>
+            <pc:sldMk cId="690076262" sldId="258"/>
+            <ac:spMk id="38" creationId="{C0B3D50F-0446-2BAC-DBB3-F8A104D8852F}"/>
+          </ac:spMkLst>
+        </pc:spChg>
+        <pc:spChg chg="add del mod">
+          <ac:chgData name="Laurits Wieslander Lyngbæk" userId="5b145d83-88ad-4e24-ae77-3c6a2a84db4d" providerId="ADAL" clId="{FBDF43B3-F54B-4170-B031-B3017B7EDAA2}" dt="2023-06-05T11:21:24.450" v="300"/>
+          <ac:spMkLst>
+            <pc:docMk/>
+            <pc:sldMk cId="690076262" sldId="258"/>
+            <ac:spMk id="41" creationId="{2BBF4725-15AB-305B-7AF3-817FA27C5C9F}"/>
+          </ac:spMkLst>
+        </pc:spChg>
+        <pc:spChg chg="mod">
+          <ac:chgData name="Laurits Wieslander Lyngbæk" userId="5b145d83-88ad-4e24-ae77-3c6a2a84db4d" providerId="ADAL" clId="{FBDF43B3-F54B-4170-B031-B3017B7EDAA2}" dt="2023-06-05T11:21:20.705" v="297"/>
+          <ac:spMkLst>
+            <pc:docMk/>
+            <pc:sldMk cId="690076262" sldId="258"/>
+            <ac:spMk id="43" creationId="{EA8B68D2-6EDF-0519-4345-7966315E716D}"/>
+          </ac:spMkLst>
+        </pc:spChg>
+        <pc:spChg chg="mod">
+          <ac:chgData name="Laurits Wieslander Lyngbæk" userId="5b145d83-88ad-4e24-ae77-3c6a2a84db4d" providerId="ADAL" clId="{FBDF43B3-F54B-4170-B031-B3017B7EDAA2}" dt="2023-06-05T11:21:20.705" v="297"/>
+          <ac:spMkLst>
+            <pc:docMk/>
+            <pc:sldMk cId="690076262" sldId="258"/>
+            <ac:spMk id="44" creationId="{F6E62836-5F9B-9AB5-19F5-2DBDCDB24B74}"/>
+          </ac:spMkLst>
+        </pc:spChg>
+        <pc:spChg chg="mod">
+          <ac:chgData name="Laurits Wieslander Lyngbæk" userId="5b145d83-88ad-4e24-ae77-3c6a2a84db4d" providerId="ADAL" clId="{FBDF43B3-F54B-4170-B031-B3017B7EDAA2}" dt="2023-06-05T11:21:20.705" v="297"/>
+          <ac:spMkLst>
+            <pc:docMk/>
+            <pc:sldMk cId="690076262" sldId="258"/>
+            <ac:spMk id="45" creationId="{E8D5C226-D3BD-EE9B-81CB-AA4E3F3B0DAC}"/>
+          </ac:spMkLst>
+        </pc:spChg>
+        <pc:spChg chg="mod">
+          <ac:chgData name="Laurits Wieslander Lyngbæk" userId="5b145d83-88ad-4e24-ae77-3c6a2a84db4d" providerId="ADAL" clId="{FBDF43B3-F54B-4170-B031-B3017B7EDAA2}" dt="2023-06-05T11:21:20.705" v="297"/>
+          <ac:spMkLst>
+            <pc:docMk/>
+            <pc:sldMk cId="690076262" sldId="258"/>
+            <ac:spMk id="46" creationId="{D468D27F-8849-412E-1D33-3C90EEB11BF3}"/>
+          </ac:spMkLst>
+        </pc:spChg>
+        <pc:spChg chg="add del mod">
+          <ac:chgData name="Laurits Wieslander Lyngbæk" userId="5b145d83-88ad-4e24-ae77-3c6a2a84db4d" providerId="ADAL" clId="{FBDF43B3-F54B-4170-B031-B3017B7EDAA2}" dt="2023-06-05T11:23:04.950" v="317" actId="478"/>
+          <ac:spMkLst>
+            <pc:docMk/>
+            <pc:sldMk cId="690076262" sldId="258"/>
+            <ac:spMk id="48" creationId="{40696C34-5D29-06DA-B17C-CFA7598C6D29}"/>
+          </ac:spMkLst>
+        </pc:spChg>
+        <pc:spChg chg="add mod">
+          <ac:chgData name="Laurits Wieslander Lyngbæk" userId="5b145d83-88ad-4e24-ae77-3c6a2a84db4d" providerId="ADAL" clId="{FBDF43B3-F54B-4170-B031-B3017B7EDAA2}" dt="2023-06-05T11:23:11.987" v="318" actId="164"/>
+          <ac:spMkLst>
+            <pc:docMk/>
+            <pc:sldMk cId="690076262" sldId="258"/>
+            <ac:spMk id="51" creationId="{D551E4C2-586E-D9DB-2289-B53FE488E8CC}"/>
+          </ac:spMkLst>
+        </pc:spChg>
+        <pc:spChg chg="mod">
+          <ac:chgData name="Laurits Wieslander Lyngbæk" userId="5b145d83-88ad-4e24-ae77-3c6a2a84db4d" providerId="ADAL" clId="{FBDF43B3-F54B-4170-B031-B3017B7EDAA2}" dt="2023-06-05T11:21:26.741" v="301"/>
+          <ac:spMkLst>
+            <pc:docMk/>
+            <pc:sldMk cId="690076262" sldId="258"/>
+            <ac:spMk id="53" creationId="{FDBCC916-FFB1-DC35-4052-69337CEDAFEE}"/>
+          </ac:spMkLst>
+        </pc:spChg>
+        <pc:spChg chg="mod">
+          <ac:chgData name="Laurits Wieslander Lyngbæk" userId="5b145d83-88ad-4e24-ae77-3c6a2a84db4d" providerId="ADAL" clId="{FBDF43B3-F54B-4170-B031-B3017B7EDAA2}" dt="2023-06-05T11:21:26.741" v="301"/>
+          <ac:spMkLst>
+            <pc:docMk/>
+            <pc:sldMk cId="690076262" sldId="258"/>
+            <ac:spMk id="54" creationId="{5004A3BD-D3B6-3638-1404-30E01EC172C4}"/>
+          </ac:spMkLst>
+        </pc:spChg>
+        <pc:spChg chg="mod">
+          <ac:chgData name="Laurits Wieslander Lyngbæk" userId="5b145d83-88ad-4e24-ae77-3c6a2a84db4d" providerId="ADAL" clId="{FBDF43B3-F54B-4170-B031-B3017B7EDAA2}" dt="2023-06-05T11:21:26.741" v="301"/>
+          <ac:spMkLst>
+            <pc:docMk/>
+            <pc:sldMk cId="690076262" sldId="258"/>
+            <ac:spMk id="55" creationId="{27705804-1694-919C-08CD-34B4E3B86D35}"/>
+          </ac:spMkLst>
+        </pc:spChg>
+        <pc:spChg chg="mod">
+          <ac:chgData name="Laurits Wieslander Lyngbæk" userId="5b145d83-88ad-4e24-ae77-3c6a2a84db4d" providerId="ADAL" clId="{FBDF43B3-F54B-4170-B031-B3017B7EDAA2}" dt="2023-06-05T11:21:26.741" v="301"/>
+          <ac:spMkLst>
+            <pc:docMk/>
+            <pc:sldMk cId="690076262" sldId="258"/>
+            <ac:spMk id="56" creationId="{20E0BACB-23CB-1A5C-2070-A3F44E88FEC0}"/>
+          </ac:spMkLst>
+        </pc:spChg>
+        <pc:spChg chg="add mod">
+          <ac:chgData name="Laurits Wieslander Lyngbæk" userId="5b145d83-88ad-4e24-ae77-3c6a2a84db4d" providerId="ADAL" clId="{FBDF43B3-F54B-4170-B031-B3017B7EDAA2}" dt="2023-06-05T11:27:03.034" v="413" actId="688"/>
+          <ac:spMkLst>
+            <pc:docMk/>
+            <pc:sldMk cId="690076262" sldId="258"/>
+            <ac:spMk id="72" creationId="{1B420A7B-7C7D-88AA-774F-44E396F25819}"/>
+          </ac:spMkLst>
+        </pc:spChg>
+        <pc:grpChg chg="add mod">
+          <ac:chgData name="Laurits Wieslander Lyngbæk" userId="5b145d83-88ad-4e24-ae77-3c6a2a84db4d" providerId="ADAL" clId="{FBDF43B3-F54B-4170-B031-B3017B7EDAA2}" dt="2023-06-05T11:23:21.474" v="320" actId="164"/>
+          <ac:grpSpMkLst>
+            <pc:docMk/>
+            <pc:sldMk cId="690076262" sldId="258"/>
+            <ac:grpSpMk id="9" creationId="{6ABB2310-B270-DB10-9D32-46AE7B947603}"/>
+          </ac:grpSpMkLst>
+        </pc:grpChg>
+        <pc:grpChg chg="add del mod">
+          <ac:chgData name="Laurits Wieslander Lyngbæk" userId="5b145d83-88ad-4e24-ae77-3c6a2a84db4d" providerId="ADAL" clId="{FBDF43B3-F54B-4170-B031-B3017B7EDAA2}" dt="2023-06-05T11:21:13.515" v="294"/>
+          <ac:grpSpMkLst>
+            <pc:docMk/>
+            <pc:sldMk cId="690076262" sldId="258"/>
+            <ac:grpSpMk id="22" creationId="{49DFC657-1DE6-D65B-4EF3-58FAEFE476DD}"/>
+          </ac:grpSpMkLst>
+        </pc:grpChg>
+        <pc:grpChg chg="add mod">
+          <ac:chgData name="Laurits Wieslander Lyngbæk" userId="5b145d83-88ad-4e24-ae77-3c6a2a84db4d" providerId="ADAL" clId="{FBDF43B3-F54B-4170-B031-B3017B7EDAA2}" dt="2023-06-05T11:23:25.782" v="321" actId="164"/>
+          <ac:grpSpMkLst>
+            <pc:docMk/>
+            <pc:sldMk cId="690076262" sldId="258"/>
+            <ac:grpSpMk id="32" creationId="{D987693D-861D-D40D-00FD-42BEB404BC66}"/>
+          </ac:grpSpMkLst>
+        </pc:grpChg>
+        <pc:grpChg chg="add del mod">
+          <ac:chgData name="Laurits Wieslander Lyngbæk" userId="5b145d83-88ad-4e24-ae77-3c6a2a84db4d" providerId="ADAL" clId="{FBDF43B3-F54B-4170-B031-B3017B7EDAA2}" dt="2023-06-05T11:21:24.450" v="300"/>
+          <ac:grpSpMkLst>
+            <pc:docMk/>
+            <pc:sldMk cId="690076262" sldId="258"/>
+            <ac:grpSpMk id="42" creationId="{0A3C12D6-2144-BB60-CF83-4EDFD8D95318}"/>
+          </ac:grpSpMkLst>
+        </pc:grpChg>
+        <pc:grpChg chg="add mod">
+          <ac:chgData name="Laurits Wieslander Lyngbæk" userId="5b145d83-88ad-4e24-ae77-3c6a2a84db4d" providerId="ADAL" clId="{FBDF43B3-F54B-4170-B031-B3017B7EDAA2}" dt="2023-06-05T11:23:11.987" v="318" actId="164"/>
+          <ac:grpSpMkLst>
+            <pc:docMk/>
+            <pc:sldMk cId="690076262" sldId="258"/>
+            <ac:grpSpMk id="52" creationId="{E12D8F45-BD10-CF27-B7CC-8036163EC8F6}"/>
+          </ac:grpSpMkLst>
+        </pc:grpChg>
+        <pc:grpChg chg="add del mod">
+          <ac:chgData name="Laurits Wieslander Lyngbæk" userId="5b145d83-88ad-4e24-ae77-3c6a2a84db4d" providerId="ADAL" clId="{FBDF43B3-F54B-4170-B031-B3017B7EDAA2}" dt="2023-06-05T11:23:53.434" v="327" actId="478"/>
+          <ac:grpSpMkLst>
+            <pc:docMk/>
+            <pc:sldMk cId="690076262" sldId="258"/>
+            <ac:grpSpMk id="61" creationId="{7EA3E818-6919-3631-1019-66AF890EAD6C}"/>
+          </ac:grpSpMkLst>
+        </pc:grpChg>
+        <pc:grpChg chg="add del mod ord">
+          <ac:chgData name="Laurits Wieslander Lyngbæk" userId="5b145d83-88ad-4e24-ae77-3c6a2a84db4d" providerId="ADAL" clId="{FBDF43B3-F54B-4170-B031-B3017B7EDAA2}" dt="2023-06-05T11:24:09.991" v="332" actId="478"/>
+          <ac:grpSpMkLst>
+            <pc:docMk/>
+            <pc:sldMk cId="690076262" sldId="258"/>
+            <ac:grpSpMk id="62" creationId="{C414E02C-5272-8511-CA96-8D2F293FF2DE}"/>
+          </ac:grpSpMkLst>
+        </pc:grpChg>
+        <pc:grpChg chg="add del mod">
+          <ac:chgData name="Laurits Wieslander Lyngbæk" userId="5b145d83-88ad-4e24-ae77-3c6a2a84db4d" providerId="ADAL" clId="{FBDF43B3-F54B-4170-B031-B3017B7EDAA2}" dt="2023-06-05T11:24:37.771" v="339" actId="478"/>
+          <ac:grpSpMkLst>
+            <pc:docMk/>
+            <pc:sldMk cId="690076262" sldId="258"/>
+            <ac:grpSpMk id="63" creationId="{443CE7E7-F8D9-159B-38D6-7C408C6F8E25}"/>
+          </ac:grpSpMkLst>
+        </pc:grpChg>
+        <pc:picChg chg="add mod">
+          <ac:chgData name="Laurits Wieslander Lyngbæk" userId="5b145d83-88ad-4e24-ae77-3c6a2a84db4d" providerId="ADAL" clId="{FBDF43B3-F54B-4170-B031-B3017B7EDAA2}" dt="2023-06-05T11:23:21.474" v="320" actId="164"/>
+          <ac:picMkLst>
+            <pc:docMk/>
+            <pc:sldMk cId="690076262" sldId="258"/>
+            <ac:picMk id="6" creationId="{3C4FA5D5-46DE-E9CB-5BBA-107C55701FD4}"/>
+          </ac:picMkLst>
+        </pc:picChg>
+        <pc:picChg chg="add del mod">
+          <ac:chgData name="Laurits Wieslander Lyngbæk" userId="5b145d83-88ad-4e24-ae77-3c6a2a84db4d" providerId="ADAL" clId="{FBDF43B3-F54B-4170-B031-B3017B7EDAA2}" dt="2023-06-05T11:23:21.474" v="320" actId="164"/>
+          <ac:picMkLst>
+            <pc:docMk/>
+            <pc:sldMk cId="690076262" sldId="258"/>
+            <ac:picMk id="7" creationId="{40412988-DD06-85BF-8794-B4774A7A20AA}"/>
+          </ac:picMkLst>
+        </pc:picChg>
+        <pc:picChg chg="add del mod">
+          <ac:chgData name="Laurits Wieslander Lyngbæk" userId="5b145d83-88ad-4e24-ae77-3c6a2a84db4d" providerId="ADAL" clId="{FBDF43B3-F54B-4170-B031-B3017B7EDAA2}" dt="2023-06-05T11:21:13.515" v="294"/>
+          <ac:picMkLst>
+            <pc:docMk/>
+            <pc:sldMk cId="690076262" sldId="258"/>
+            <ac:picMk id="19" creationId="{2FAF7081-519D-E7E9-FDBD-EF3CB1A36C4B}"/>
+          </ac:picMkLst>
+        </pc:picChg>
+        <pc:picChg chg="add del mod">
+          <ac:chgData name="Laurits Wieslander Lyngbæk" userId="5b145d83-88ad-4e24-ae77-3c6a2a84db4d" providerId="ADAL" clId="{FBDF43B3-F54B-4170-B031-B3017B7EDAA2}" dt="2023-06-05T11:21:13.515" v="294"/>
+          <ac:picMkLst>
+            <pc:docMk/>
+            <pc:sldMk cId="690076262" sldId="258"/>
+            <ac:picMk id="20" creationId="{B4459F55-CE4C-BE66-32A6-C8C63B484722}"/>
+          </ac:picMkLst>
+        </pc:picChg>
+        <pc:picChg chg="add mod">
+          <ac:chgData name="Laurits Wieslander Lyngbæk" userId="5b145d83-88ad-4e24-ae77-3c6a2a84db4d" providerId="ADAL" clId="{FBDF43B3-F54B-4170-B031-B3017B7EDAA2}" dt="2023-06-05T11:23:25.782" v="321" actId="164"/>
+          <ac:picMkLst>
+            <pc:docMk/>
+            <pc:sldMk cId="690076262" sldId="258"/>
+            <ac:picMk id="29" creationId="{B79DF70E-B245-01E8-5AC5-9EDCC814838E}"/>
+          </ac:picMkLst>
+        </pc:picChg>
+        <pc:picChg chg="add mod">
+          <ac:chgData name="Laurits Wieslander Lyngbæk" userId="5b145d83-88ad-4e24-ae77-3c6a2a84db4d" providerId="ADAL" clId="{FBDF43B3-F54B-4170-B031-B3017B7EDAA2}" dt="2023-06-05T11:23:25.782" v="321" actId="164"/>
+          <ac:picMkLst>
+            <pc:docMk/>
+            <pc:sldMk cId="690076262" sldId="258"/>
+            <ac:picMk id="30" creationId="{CF384435-041D-2D51-7ECA-18A499818C75}"/>
+          </ac:picMkLst>
+        </pc:picChg>
+        <pc:picChg chg="add del mod">
+          <ac:chgData name="Laurits Wieslander Lyngbæk" userId="5b145d83-88ad-4e24-ae77-3c6a2a84db4d" providerId="ADAL" clId="{FBDF43B3-F54B-4170-B031-B3017B7EDAA2}" dt="2023-06-05T11:21:24.450" v="300"/>
+          <ac:picMkLst>
+            <pc:docMk/>
+            <pc:sldMk cId="690076262" sldId="258"/>
+            <ac:picMk id="39" creationId="{21B50982-737A-B103-2CBC-A5248541203F}"/>
+          </ac:picMkLst>
+        </pc:picChg>
+        <pc:picChg chg="add del mod">
+          <ac:chgData name="Laurits Wieslander Lyngbæk" userId="5b145d83-88ad-4e24-ae77-3c6a2a84db4d" providerId="ADAL" clId="{FBDF43B3-F54B-4170-B031-B3017B7EDAA2}" dt="2023-06-05T11:21:24.450" v="300"/>
+          <ac:picMkLst>
+            <pc:docMk/>
+            <pc:sldMk cId="690076262" sldId="258"/>
+            <ac:picMk id="40" creationId="{0630DD26-9E01-D657-7F67-29278C3D45C3}"/>
+          </ac:picMkLst>
+        </pc:picChg>
+        <pc:picChg chg="add mod">
+          <ac:chgData name="Laurits Wieslander Lyngbæk" userId="5b145d83-88ad-4e24-ae77-3c6a2a84db4d" providerId="ADAL" clId="{FBDF43B3-F54B-4170-B031-B3017B7EDAA2}" dt="2023-06-05T11:23:11.987" v="318" actId="164"/>
+          <ac:picMkLst>
+            <pc:docMk/>
+            <pc:sldMk cId="690076262" sldId="258"/>
+            <ac:picMk id="49" creationId="{8D2EA1F8-83DE-4ECB-AC43-206522C74B35}"/>
+          </ac:picMkLst>
+        </pc:picChg>
+        <pc:picChg chg="add mod">
+          <ac:chgData name="Laurits Wieslander Lyngbæk" userId="5b145d83-88ad-4e24-ae77-3c6a2a84db4d" providerId="ADAL" clId="{FBDF43B3-F54B-4170-B031-B3017B7EDAA2}" dt="2023-06-05T11:23:11.987" v="318" actId="164"/>
+          <ac:picMkLst>
+            <pc:docMk/>
+            <pc:sldMk cId="690076262" sldId="258"/>
+            <ac:picMk id="50" creationId="{559B55ED-2DA1-0555-FD05-57CDD749EB4A}"/>
+          </ac:picMkLst>
+        </pc:picChg>
+        <pc:picChg chg="add del mod">
+          <ac:chgData name="Laurits Wieslander Lyngbæk" userId="5b145d83-88ad-4e24-ae77-3c6a2a84db4d" providerId="ADAL" clId="{FBDF43B3-F54B-4170-B031-B3017B7EDAA2}" dt="2023-06-05T11:22:04.037" v="305"/>
+          <ac:picMkLst>
+            <pc:docMk/>
+            <pc:sldMk cId="690076262" sldId="258"/>
+            <ac:picMk id="58" creationId="{20A5E0E2-464E-D678-DBAE-51132576D832}"/>
+          </ac:picMkLst>
+        </pc:picChg>
+        <pc:picChg chg="add del mod">
+          <ac:chgData name="Laurits Wieslander Lyngbæk" userId="5b145d83-88ad-4e24-ae77-3c6a2a84db4d" providerId="ADAL" clId="{FBDF43B3-F54B-4170-B031-B3017B7EDAA2}" dt="2023-06-05T11:22:06.977" v="308"/>
+          <ac:picMkLst>
+            <pc:docMk/>
+            <pc:sldMk cId="690076262" sldId="258"/>
+            <ac:picMk id="60" creationId="{271FA7D5-B536-3A9C-4F16-F44E7D1A53E7}"/>
+          </ac:picMkLst>
+        </pc:picChg>
+        <pc:picChg chg="add mod modCrop">
+          <ac:chgData name="Laurits Wieslander Lyngbæk" userId="5b145d83-88ad-4e24-ae77-3c6a2a84db4d" providerId="ADAL" clId="{FBDF43B3-F54B-4170-B031-B3017B7EDAA2}" dt="2023-06-05T11:26:15.962" v="369" actId="732"/>
+          <ac:picMkLst>
+            <pc:docMk/>
+            <pc:sldMk cId="690076262" sldId="258"/>
+            <ac:picMk id="65" creationId="{898981E4-A76F-3843-1C32-9D4DC614B313}"/>
+          </ac:picMkLst>
+        </pc:picChg>
+        <pc:picChg chg="add mod modCrop">
+          <ac:chgData name="Laurits Wieslander Lyngbæk" userId="5b145d83-88ad-4e24-ae77-3c6a2a84db4d" providerId="ADAL" clId="{FBDF43B3-F54B-4170-B031-B3017B7EDAA2}" dt="2023-06-05T12:25:42.672" v="624" actId="1076"/>
+          <ac:picMkLst>
+            <pc:docMk/>
+            <pc:sldMk cId="690076262" sldId="258"/>
+            <ac:picMk id="67" creationId="{650E17C9-59AC-C611-D906-BA9637D9C204}"/>
+          </ac:picMkLst>
+        </pc:picChg>
+        <pc:picChg chg="add mod modCrop">
+          <ac:chgData name="Laurits Wieslander Lyngbæk" userId="5b145d83-88ad-4e24-ae77-3c6a2a84db4d" providerId="ADAL" clId="{FBDF43B3-F54B-4170-B031-B3017B7EDAA2}" dt="2023-06-05T12:24:59.692" v="588" actId="1076"/>
+          <ac:picMkLst>
+            <pc:docMk/>
+            <pc:sldMk cId="690076262" sldId="258"/>
+            <ac:picMk id="69" creationId="{5F105017-01CB-6A84-1BF9-22F2FA530463}"/>
+          </ac:picMkLst>
+        </pc:picChg>
+        <pc:cxnChg chg="add del mod">
+          <ac:chgData name="Laurits Wieslander Lyngbæk" userId="5b145d83-88ad-4e24-ae77-3c6a2a84db4d" providerId="ADAL" clId="{FBDF43B3-F54B-4170-B031-B3017B7EDAA2}" dt="2023-06-05T11:23:02.327" v="316" actId="478"/>
+          <ac:cxnSpMkLst>
+            <pc:docMk/>
+            <pc:sldMk cId="690076262" sldId="258"/>
+            <ac:cxnSpMk id="4" creationId="{B3873565-914F-4D34-1D4E-E11B499098D9}"/>
+          </ac:cxnSpMkLst>
+        </pc:cxnChg>
+        <pc:cxnChg chg="add del mod">
+          <ac:chgData name="Laurits Wieslander Lyngbæk" userId="5b145d83-88ad-4e24-ae77-3c6a2a84db4d" providerId="ADAL" clId="{FBDF43B3-F54B-4170-B031-B3017B7EDAA2}" dt="2023-06-05T11:21:13.515" v="294"/>
+          <ac:cxnSpMkLst>
+            <pc:docMk/>
+            <pc:sldMk cId="690076262" sldId="258"/>
+            <ac:cxnSpMk id="17" creationId="{14283DA9-DA9B-37D6-E940-EAF512A5C596}"/>
+          </ac:cxnSpMkLst>
+        </pc:cxnChg>
+        <pc:cxnChg chg="add del mod">
+          <ac:chgData name="Laurits Wieslander Lyngbæk" userId="5b145d83-88ad-4e24-ae77-3c6a2a84db4d" providerId="ADAL" clId="{FBDF43B3-F54B-4170-B031-B3017B7EDAA2}" dt="2023-06-05T11:22:59.628" v="315" actId="478"/>
+          <ac:cxnSpMkLst>
+            <pc:docMk/>
+            <pc:sldMk cId="690076262" sldId="258"/>
+            <ac:cxnSpMk id="27" creationId="{75767729-C72E-B1BF-A036-94986D539624}"/>
+          </ac:cxnSpMkLst>
+        </pc:cxnChg>
+        <pc:cxnChg chg="add del mod">
+          <ac:chgData name="Laurits Wieslander Lyngbæk" userId="5b145d83-88ad-4e24-ae77-3c6a2a84db4d" providerId="ADAL" clId="{FBDF43B3-F54B-4170-B031-B3017B7EDAA2}" dt="2023-06-05T11:21:24.450" v="300"/>
+          <ac:cxnSpMkLst>
+            <pc:docMk/>
+            <pc:sldMk cId="690076262" sldId="258"/>
+            <ac:cxnSpMk id="37" creationId="{04980A6B-A01C-FEB3-0378-17A2B810C8EA}"/>
+          </ac:cxnSpMkLst>
+        </pc:cxnChg>
+        <pc:cxnChg chg="add del mod">
+          <ac:chgData name="Laurits Wieslander Lyngbæk" userId="5b145d83-88ad-4e24-ae77-3c6a2a84db4d" providerId="ADAL" clId="{FBDF43B3-F54B-4170-B031-B3017B7EDAA2}" dt="2023-06-05T11:23:04.950" v="317" actId="478"/>
+          <ac:cxnSpMkLst>
+            <pc:docMk/>
+            <pc:sldMk cId="690076262" sldId="258"/>
+            <ac:cxnSpMk id="47" creationId="{5F36F1CE-F1D4-78F4-3B1C-03ED5A681E1E}"/>
+          </ac:cxnSpMkLst>
+        </pc:cxnChg>
+        <pc:cxnChg chg="add mod">
+          <ac:chgData name="Laurits Wieslander Lyngbæk" userId="5b145d83-88ad-4e24-ae77-3c6a2a84db4d" providerId="ADAL" clId="{FBDF43B3-F54B-4170-B031-B3017B7EDAA2}" dt="2023-06-05T11:26:30.096" v="371" actId="1076"/>
+          <ac:cxnSpMkLst>
+            <pc:docMk/>
+            <pc:sldMk cId="690076262" sldId="258"/>
+            <ac:cxnSpMk id="70" creationId="{467F1740-F2CC-7341-ADE4-F6784E7B6A6C}"/>
+          </ac:cxnSpMkLst>
+        </pc:cxnChg>
+      </pc:sldChg>
+      <pc:sldChg chg="addSp delSp modSp new mod">
+        <pc:chgData name="Laurits Wieslander Lyngbæk" userId="5b145d83-88ad-4e24-ae77-3c6a2a84db4d" providerId="ADAL" clId="{FBDF43B3-F54B-4170-B031-B3017B7EDAA2}" dt="2023-06-05T12:26:41.633" v="654" actId="1076"/>
+        <pc:sldMkLst>
+          <pc:docMk/>
+          <pc:sldMk cId="3278369293" sldId="259"/>
+        </pc:sldMkLst>
+        <pc:spChg chg="del">
+          <ac:chgData name="Laurits Wieslander Lyngbæk" userId="5b145d83-88ad-4e24-ae77-3c6a2a84db4d" providerId="ADAL" clId="{FBDF43B3-F54B-4170-B031-B3017B7EDAA2}" dt="2023-06-05T11:27:19.230" v="415" actId="478"/>
+          <ac:spMkLst>
+            <pc:docMk/>
+            <pc:sldMk cId="3278369293" sldId="259"/>
+            <ac:spMk id="2" creationId="{EB1A0C4D-9BDC-AF80-8613-D54B1ABD58AD}"/>
+          </ac:spMkLst>
+        </pc:spChg>
+        <pc:spChg chg="del">
+          <ac:chgData name="Laurits Wieslander Lyngbæk" userId="5b145d83-88ad-4e24-ae77-3c6a2a84db4d" providerId="ADAL" clId="{FBDF43B3-F54B-4170-B031-B3017B7EDAA2}" dt="2023-06-05T11:27:22.302" v="416" actId="22"/>
+          <ac:spMkLst>
+            <pc:docMk/>
+            <pc:sldMk cId="3278369293" sldId="259"/>
+            <ac:spMk id="3" creationId="{D3E34B63-0340-DFE3-A5A5-CF594255E0D1}"/>
+          </ac:spMkLst>
+        </pc:spChg>
+        <pc:spChg chg="add del mod">
+          <ac:chgData name="Laurits Wieslander Lyngbæk" userId="5b145d83-88ad-4e24-ae77-3c6a2a84db4d" providerId="ADAL" clId="{FBDF43B3-F54B-4170-B031-B3017B7EDAA2}" dt="2023-06-05T12:21:54.685" v="538"/>
+          <ac:spMkLst>
+            <pc:docMk/>
+            <pc:sldMk cId="3278369293" sldId="259"/>
+            <ac:spMk id="9" creationId="{14A47D6E-636E-6669-0A6F-047D005EFA1D}"/>
+          </ac:spMkLst>
+        </pc:spChg>
+        <pc:spChg chg="add del mod">
+          <ac:chgData name="Laurits Wieslander Lyngbæk" userId="5b145d83-88ad-4e24-ae77-3c6a2a84db4d" providerId="ADAL" clId="{FBDF43B3-F54B-4170-B031-B3017B7EDAA2}" dt="2023-06-05T12:21:54.685" v="538"/>
+          <ac:spMkLst>
+            <pc:docMk/>
+            <pc:sldMk cId="3278369293" sldId="259"/>
+            <ac:spMk id="12" creationId="{D11D4FBA-B092-8D01-CE78-B36EC1706461}"/>
+          </ac:spMkLst>
+        </pc:spChg>
+        <pc:spChg chg="add del mod">
+          <ac:chgData name="Laurits Wieslander Lyngbæk" userId="5b145d83-88ad-4e24-ae77-3c6a2a84db4d" providerId="ADAL" clId="{FBDF43B3-F54B-4170-B031-B3017B7EDAA2}" dt="2023-06-05T12:21:54.685" v="538"/>
+          <ac:spMkLst>
+            <pc:docMk/>
+            <pc:sldMk cId="3278369293" sldId="259"/>
+            <ac:spMk id="13" creationId="{10042F37-E69C-66D6-C529-EF6E9F51D019}"/>
+          </ac:spMkLst>
+        </pc:spChg>
+        <pc:spChg chg="add del mod">
+          <ac:chgData name="Laurits Wieslander Lyngbæk" userId="5b145d83-88ad-4e24-ae77-3c6a2a84db4d" providerId="ADAL" clId="{FBDF43B3-F54B-4170-B031-B3017B7EDAA2}" dt="2023-06-05T12:21:54.685" v="538"/>
+          <ac:spMkLst>
+            <pc:docMk/>
+            <pc:sldMk cId="3278369293" sldId="259"/>
+            <ac:spMk id="14" creationId="{6F914596-02BB-14C1-CE4A-9343345443B5}"/>
+          </ac:spMkLst>
+        </pc:spChg>
+        <pc:spChg chg="add del mod">
+          <ac:chgData name="Laurits Wieslander Lyngbæk" userId="5b145d83-88ad-4e24-ae77-3c6a2a84db4d" providerId="ADAL" clId="{FBDF43B3-F54B-4170-B031-B3017B7EDAA2}" dt="2023-06-05T12:21:54.685" v="538"/>
+          <ac:spMkLst>
+            <pc:docMk/>
+            <pc:sldMk cId="3278369293" sldId="259"/>
+            <ac:spMk id="15" creationId="{A3DB802A-FF59-2532-C342-8ABE30CFFE4E}"/>
+          </ac:spMkLst>
+        </pc:spChg>
+        <pc:spChg chg="add del mod">
+          <ac:chgData name="Laurits Wieslander Lyngbæk" userId="5b145d83-88ad-4e24-ae77-3c6a2a84db4d" providerId="ADAL" clId="{FBDF43B3-F54B-4170-B031-B3017B7EDAA2}" dt="2023-06-05T12:21:54.685" v="538"/>
+          <ac:spMkLst>
+            <pc:docMk/>
+            <pc:sldMk cId="3278369293" sldId="259"/>
+            <ac:spMk id="16" creationId="{204763CC-E921-B845-257E-951732A7DE5B}"/>
+          </ac:spMkLst>
+        </pc:spChg>
+        <pc:spChg chg="add del mod">
+          <ac:chgData name="Laurits Wieslander Lyngbæk" userId="5b145d83-88ad-4e24-ae77-3c6a2a84db4d" providerId="ADAL" clId="{FBDF43B3-F54B-4170-B031-B3017B7EDAA2}" dt="2023-06-05T12:21:54.685" v="538"/>
+          <ac:spMkLst>
+            <pc:docMk/>
+            <pc:sldMk cId="3278369293" sldId="259"/>
+            <ac:spMk id="17" creationId="{E40ABC33-38C8-41BA-9E8A-B97B65882965}"/>
+          </ac:spMkLst>
+        </pc:spChg>
+        <pc:spChg chg="add del mod">
+          <ac:chgData name="Laurits Wieslander Lyngbæk" userId="5b145d83-88ad-4e24-ae77-3c6a2a84db4d" providerId="ADAL" clId="{FBDF43B3-F54B-4170-B031-B3017B7EDAA2}" dt="2023-06-05T12:26:13.314" v="644" actId="22"/>
+          <ac:spMkLst>
+            <pc:docMk/>
+            <pc:sldMk cId="3278369293" sldId="259"/>
+            <ac:spMk id="26" creationId="{BF55C392-3487-3A4D-94DC-1579CC3C311B}"/>
+          </ac:spMkLst>
+        </pc:spChg>
+        <pc:picChg chg="add del mod">
+          <ac:chgData name="Laurits Wieslander Lyngbæk" userId="5b145d83-88ad-4e24-ae77-3c6a2a84db4d" providerId="ADAL" clId="{FBDF43B3-F54B-4170-B031-B3017B7EDAA2}" dt="2023-06-05T12:20:50.789" v="516" actId="478"/>
+          <ac:picMkLst>
+            <pc:docMk/>
+            <pc:sldMk cId="3278369293" sldId="259"/>
+            <ac:picMk id="3" creationId="{0B219166-3891-E271-A944-4893F8AAAD26}"/>
+          </ac:picMkLst>
+        </pc:picChg>
+        <pc:picChg chg="add del mod ord">
+          <ac:chgData name="Laurits Wieslander Lyngbæk" userId="5b145d83-88ad-4e24-ae77-3c6a2a84db4d" providerId="ADAL" clId="{FBDF43B3-F54B-4170-B031-B3017B7EDAA2}" dt="2023-06-05T12:26:10.981" v="641" actId="478"/>
+          <ac:picMkLst>
+            <pc:docMk/>
+            <pc:sldMk cId="3278369293" sldId="259"/>
+            <ac:picMk id="5" creationId="{F4B7675D-6102-0137-3DF8-CA1A78902778}"/>
+          </ac:picMkLst>
+        </pc:picChg>
+        <pc:picChg chg="add del mod modCrop">
+          <ac:chgData name="Laurits Wieslander Lyngbæk" userId="5b145d83-88ad-4e24-ae77-3c6a2a84db4d" providerId="ADAL" clId="{FBDF43B3-F54B-4170-B031-B3017B7EDAA2}" dt="2023-06-05T12:26:30.126" v="646" actId="1076"/>
+          <ac:picMkLst>
+            <pc:docMk/>
+            <pc:sldMk cId="3278369293" sldId="259"/>
+            <ac:picMk id="6" creationId="{8A5FE8A6-2DC0-8A5F-0E58-AB88B4AF1439}"/>
+          </ac:picMkLst>
+        </pc:picChg>
+        <pc:picChg chg="add del mod modCrop">
+          <ac:chgData name="Laurits Wieslander Lyngbæk" userId="5b145d83-88ad-4e24-ae77-3c6a2a84db4d" providerId="ADAL" clId="{FBDF43B3-F54B-4170-B031-B3017B7EDAA2}" dt="2023-06-05T11:45:10.263" v="433" actId="478"/>
+          <ac:picMkLst>
+            <pc:docMk/>
+            <pc:sldMk cId="3278369293" sldId="259"/>
+            <ac:picMk id="7" creationId="{C8D6AECD-016A-2AC8-F81C-9C4C4EF00D25}"/>
+          </ac:picMkLst>
+        </pc:picChg>
+        <pc:picChg chg="add del mod">
+          <ac:chgData name="Laurits Wieslander Lyngbæk" userId="5b145d83-88ad-4e24-ae77-3c6a2a84db4d" providerId="ADAL" clId="{FBDF43B3-F54B-4170-B031-B3017B7EDAA2}" dt="2023-06-05T12:21:54.685" v="538"/>
+          <ac:picMkLst>
+            <pc:docMk/>
+            <pc:sldMk cId="3278369293" sldId="259"/>
+            <ac:picMk id="10" creationId="{2E29C21A-A149-140F-6234-D61C11050F29}"/>
+          </ac:picMkLst>
+        </pc:picChg>
+        <pc:picChg chg="add del mod">
+          <ac:chgData name="Laurits Wieslander Lyngbæk" userId="5b145d83-88ad-4e24-ae77-3c6a2a84db4d" providerId="ADAL" clId="{FBDF43B3-F54B-4170-B031-B3017B7EDAA2}" dt="2023-06-05T12:21:54.685" v="538"/>
+          <ac:picMkLst>
+            <pc:docMk/>
+            <pc:sldMk cId="3278369293" sldId="259"/>
+            <ac:picMk id="11" creationId="{5F5685ED-8FCD-2BCE-7258-0B28A2A8E8B6}"/>
+          </ac:picMkLst>
+        </pc:picChg>
+        <pc:picChg chg="add del">
+          <ac:chgData name="Laurits Wieslander Lyngbæk" userId="5b145d83-88ad-4e24-ae77-3c6a2a84db4d" providerId="ADAL" clId="{FBDF43B3-F54B-4170-B031-B3017B7EDAA2}" dt="2023-06-05T12:26:12.179" v="643" actId="22"/>
+          <ac:picMkLst>
+            <pc:docMk/>
+            <pc:sldMk cId="3278369293" sldId="259"/>
+            <ac:picMk id="28" creationId="{C794E4DE-9579-DC46-5A2E-E44D140DAA2A}"/>
+          </ac:picMkLst>
+        </pc:picChg>
+        <pc:picChg chg="add mod ord">
+          <ac:chgData name="Laurits Wieslander Lyngbæk" userId="5b145d83-88ad-4e24-ae77-3c6a2a84db4d" providerId="ADAL" clId="{FBDF43B3-F54B-4170-B031-B3017B7EDAA2}" dt="2023-06-05T12:26:41.633" v="654" actId="1076"/>
+          <ac:picMkLst>
+            <pc:docMk/>
+            <pc:sldMk cId="3278369293" sldId="259"/>
+            <ac:picMk id="30" creationId="{4381F618-C048-9438-390A-5DC6C96E0605}"/>
+          </ac:picMkLst>
+        </pc:picChg>
+        <pc:cxnChg chg="add del mod">
+          <ac:chgData name="Laurits Wieslander Lyngbæk" userId="5b145d83-88ad-4e24-ae77-3c6a2a84db4d" providerId="ADAL" clId="{FBDF43B3-F54B-4170-B031-B3017B7EDAA2}" dt="2023-06-05T12:21:54.685" v="538"/>
+          <ac:cxnSpMkLst>
+            <pc:docMk/>
+            <pc:sldMk cId="3278369293" sldId="259"/>
+            <ac:cxnSpMk id="8" creationId="{28AAD152-8480-4BA1-1A5A-F8874882589D}"/>
+          </ac:cxnSpMkLst>
+        </pc:cxnChg>
+        <pc:cxnChg chg="add mod">
+          <ac:chgData name="Laurits Wieslander Lyngbæk" userId="5b145d83-88ad-4e24-ae77-3c6a2a84db4d" providerId="ADAL" clId="{FBDF43B3-F54B-4170-B031-B3017B7EDAA2}" dt="2023-06-05T12:23:42.236" v="573" actId="1076"/>
+          <ac:cxnSpMkLst>
+            <pc:docMk/>
+            <pc:sldMk cId="3278369293" sldId="259"/>
+            <ac:cxnSpMk id="20" creationId="{F61D8B74-1275-F9D0-7F97-B3AF770451A0}"/>
+          </ac:cxnSpMkLst>
+        </pc:cxnChg>
+      </pc:sldChg>
+    </pc:docChg>
+  </pc:docChgLst>
+</pc:chgInfo>
 </file>
 
 <file path=ppt/slideLayouts/slideLayout1.xml><?xml version="1.0" encoding="utf-8"?>
@@ -256,7 +1227,7 @@
           <a:p>
             <a:fld id="{8821AA30-D8BC-461F-9C33-78DC5A844F95}" type="datetimeFigureOut">
               <a:rPr lang="en-DK" smtClean="0"/>
-              <a:t>30/05/2023</a:t>
+              <a:t>05/06/2023</a:t>
             </a:fld>
             <a:endParaRPr lang="en-DK"/>
           </a:p>
@@ -456,7 +1427,7 @@
           <a:p>
             <a:fld id="{8821AA30-D8BC-461F-9C33-78DC5A844F95}" type="datetimeFigureOut">
               <a:rPr lang="en-DK" smtClean="0"/>
-              <a:t>30/05/2023</a:t>
+              <a:t>05/06/2023</a:t>
             </a:fld>
             <a:endParaRPr lang="en-DK"/>
           </a:p>
@@ -666,7 +1637,7 @@
           <a:p>
             <a:fld id="{8821AA30-D8BC-461F-9C33-78DC5A844F95}" type="datetimeFigureOut">
               <a:rPr lang="en-DK" smtClean="0"/>
-              <a:t>30/05/2023</a:t>
+              <a:t>05/06/2023</a:t>
             </a:fld>
             <a:endParaRPr lang="en-DK"/>
           </a:p>
@@ -866,7 +1837,7 @@
           <a:p>
             <a:fld id="{8821AA30-D8BC-461F-9C33-78DC5A844F95}" type="datetimeFigureOut">
               <a:rPr lang="en-DK" smtClean="0"/>
-              <a:t>30/05/2023</a:t>
+              <a:t>05/06/2023</a:t>
             </a:fld>
             <a:endParaRPr lang="en-DK"/>
           </a:p>
@@ -1142,7 +2113,7 @@
           <a:p>
             <a:fld id="{8821AA30-D8BC-461F-9C33-78DC5A844F95}" type="datetimeFigureOut">
               <a:rPr lang="en-DK" smtClean="0"/>
-              <a:t>30/05/2023</a:t>
+              <a:t>05/06/2023</a:t>
             </a:fld>
             <a:endParaRPr lang="en-DK"/>
           </a:p>
@@ -1410,7 +2381,7 @@
           <a:p>
             <a:fld id="{8821AA30-D8BC-461F-9C33-78DC5A844F95}" type="datetimeFigureOut">
               <a:rPr lang="en-DK" smtClean="0"/>
-              <a:t>30/05/2023</a:t>
+              <a:t>05/06/2023</a:t>
             </a:fld>
             <a:endParaRPr lang="en-DK"/>
           </a:p>
@@ -1825,7 +2796,7 @@
           <a:p>
             <a:fld id="{8821AA30-D8BC-461F-9C33-78DC5A844F95}" type="datetimeFigureOut">
               <a:rPr lang="en-DK" smtClean="0"/>
-              <a:t>30/05/2023</a:t>
+              <a:t>05/06/2023</a:t>
             </a:fld>
             <a:endParaRPr lang="en-DK"/>
           </a:p>
@@ -1967,7 +2938,7 @@
           <a:p>
             <a:fld id="{8821AA30-D8BC-461F-9C33-78DC5A844F95}" type="datetimeFigureOut">
               <a:rPr lang="en-DK" smtClean="0"/>
-              <a:t>30/05/2023</a:t>
+              <a:t>05/06/2023</a:t>
             </a:fld>
             <a:endParaRPr lang="en-DK"/>
           </a:p>
@@ -2080,7 +3051,7 @@
           <a:p>
             <a:fld id="{8821AA30-D8BC-461F-9C33-78DC5A844F95}" type="datetimeFigureOut">
               <a:rPr lang="en-DK" smtClean="0"/>
-              <a:t>30/05/2023</a:t>
+              <a:t>05/06/2023</a:t>
             </a:fld>
             <a:endParaRPr lang="en-DK"/>
           </a:p>
@@ -2393,7 +3364,7 @@
           <a:p>
             <a:fld id="{8821AA30-D8BC-461F-9C33-78DC5A844F95}" type="datetimeFigureOut">
               <a:rPr lang="en-DK" smtClean="0"/>
-              <a:t>30/05/2023</a:t>
+              <a:t>05/06/2023</a:t>
             </a:fld>
             <a:endParaRPr lang="en-DK"/>
           </a:p>
@@ -2682,7 +3653,7 @@
           <a:p>
             <a:fld id="{8821AA30-D8BC-461F-9C33-78DC5A844F95}" type="datetimeFigureOut">
               <a:rPr lang="en-DK" smtClean="0"/>
-              <a:t>30/05/2023</a:t>
+              <a:t>05/06/2023</a:t>
             </a:fld>
             <a:endParaRPr lang="en-DK"/>
           </a:p>
@@ -2925,7 +3896,7 @@
           <a:p>
             <a:fld id="{8821AA30-D8BC-461F-9C33-78DC5A844F95}" type="datetimeFigureOut">
               <a:rPr lang="en-DK" smtClean="0"/>
-              <a:t>30/05/2023</a:t>
+              <a:t>05/06/2023</a:t>
             </a:fld>
             <a:endParaRPr lang="en-DK"/>
           </a:p>
@@ -3924,6 +4895,1265 @@
 </p:sld>
 </file>
 
+<file path=ppt/slides/slide2.xml><?xml version="1.0" encoding="utf-8"?>
+<p:sld xmlns:a="http://schemas.openxmlformats.org/drawingml/2006/main" xmlns:r="http://schemas.openxmlformats.org/officeDocument/2006/relationships" xmlns:p="http://schemas.openxmlformats.org/presentationml/2006/main">
+  <p:cSld>
+    <p:spTree>
+      <p:nvGrpSpPr>
+        <p:cNvPr id="1" name=""/>
+        <p:cNvGrpSpPr/>
+        <p:nvPr/>
+      </p:nvGrpSpPr>
+      <p:grpSpPr>
+        <a:xfrm>
+          <a:off x="0" y="0"/>
+          <a:ext cx="0" cy="0"/>
+          <a:chOff x="0" y="0"/>
+          <a:chExt cx="0" cy="0"/>
+        </a:xfrm>
+      </p:grpSpPr>
+      <p:cxnSp>
+        <p:nvCxnSpPr>
+          <p:cNvPr id="5" name="Straight Arrow Connector 4">
+            <a:extLst>
+              <a:ext uri="{FF2B5EF4-FFF2-40B4-BE49-F238E27FC236}">
+                <a16:creationId xmlns:a16="http://schemas.microsoft.com/office/drawing/2014/main" id="{A160E844-882E-D85A-A3E6-361794AE4ABD}"/>
+              </a:ext>
+            </a:extLst>
+          </p:cNvPr>
+          <p:cNvCxnSpPr>
+            <a:cxnSpLocks/>
+          </p:cNvCxnSpPr>
+          <p:nvPr/>
+        </p:nvCxnSpPr>
+        <p:spPr>
+          <a:xfrm>
+            <a:off x="6422020" y="1777429"/>
+            <a:ext cx="821374" cy="3174715"/>
+          </a:xfrm>
+          <a:prstGeom prst="straightConnector1">
+            <a:avLst/>
+          </a:prstGeom>
+          <a:ln w="57150">
+            <a:solidFill>
+              <a:schemeClr val="tx1"/>
+            </a:solidFill>
+            <a:tailEnd type="triangle"/>
+          </a:ln>
+        </p:spPr>
+        <p:style>
+          <a:lnRef idx="1">
+            <a:schemeClr val="accent1"/>
+          </a:lnRef>
+          <a:fillRef idx="0">
+            <a:schemeClr val="accent1"/>
+          </a:fillRef>
+          <a:effectRef idx="0">
+            <a:schemeClr val="accent1"/>
+          </a:effectRef>
+          <a:fontRef idx="minor">
+            <a:schemeClr val="tx1"/>
+          </a:fontRef>
+        </p:style>
+      </p:cxnSp>
+      <p:sp>
+        <p:nvSpPr>
+          <p:cNvPr id="8" name="TextBox 7">
+            <a:extLst>
+              <a:ext uri="{FF2B5EF4-FFF2-40B4-BE49-F238E27FC236}">
+                <a16:creationId xmlns:a16="http://schemas.microsoft.com/office/drawing/2014/main" id="{4F00BCB7-F445-D0C6-FC29-607084F9B2C3}"/>
+              </a:ext>
+            </a:extLst>
+          </p:cNvPr>
+          <p:cNvSpPr txBox="1"/>
+          <p:nvPr/>
+        </p:nvSpPr>
+        <p:spPr>
+          <a:xfrm rot="20377531">
+            <a:off x="7209824" y="4825576"/>
+            <a:ext cx="770561" cy="369332"/>
+          </a:xfrm>
+          <a:prstGeom prst="rect">
+            <a:avLst/>
+          </a:prstGeom>
+          <a:noFill/>
+        </p:spPr>
+        <p:txBody>
+          <a:bodyPr wrap="square" rtlCol="0">
+            <a:spAutoFit/>
+          </a:bodyPr>
+          <a:lstStyle/>
+          <a:p>
+            <a:r>
+              <a:rPr lang="en-GB" dirty="0">
+                <a:latin typeface="Times New Roman" panose="02020603050405020304" pitchFamily="18" charset="0"/>
+                <a:cs typeface="Times New Roman" panose="02020603050405020304" pitchFamily="18" charset="0"/>
+              </a:rPr>
+              <a:t>Time</a:t>
+            </a:r>
+            <a:endParaRPr lang="en-DK" dirty="0">
+              <a:latin typeface="Times New Roman" panose="02020603050405020304" pitchFamily="18" charset="0"/>
+              <a:cs typeface="Times New Roman" panose="02020603050405020304" pitchFamily="18" charset="0"/>
+            </a:endParaRPr>
+          </a:p>
+        </p:txBody>
+      </p:sp>
+      <p:pic>
+        <p:nvPicPr>
+          <p:cNvPr id="11" name="Picture 10" descr="A picture containing grey, granite, fabric, ground&#10;&#10;Description automatically generated">
+            <a:extLst>
+              <a:ext uri="{FF2B5EF4-FFF2-40B4-BE49-F238E27FC236}">
+                <a16:creationId xmlns:a16="http://schemas.microsoft.com/office/drawing/2014/main" id="{2AB1FB0B-6E64-BBF4-652A-857C98368146}"/>
+              </a:ext>
+            </a:extLst>
+          </p:cNvPr>
+          <p:cNvPicPr>
+            <a:picLocks noChangeAspect="1"/>
+          </p:cNvPicPr>
+          <p:nvPr/>
+        </p:nvPicPr>
+        <p:blipFill>
+          <a:blip r:embed="rId2">
+            <a:extLst>
+              <a:ext uri="{28A0092B-C50C-407E-A947-70E740481C1C}">
+                <a14:useLocalDpi xmlns:a14="http://schemas.microsoft.com/office/drawing/2010/main" val="0"/>
+              </a:ext>
+            </a:extLst>
+          </a:blip>
+          <a:stretch>
+            <a:fillRect/>
+          </a:stretch>
+        </p:blipFill>
+        <p:spPr>
+          <a:xfrm>
+            <a:off x="4815709" y="3551101"/>
+            <a:ext cx="2016998" cy="1094470"/>
+          </a:xfrm>
+          <a:prstGeom prst="rect">
+            <a:avLst/>
+          </a:prstGeom>
+          <a:ln w="28575">
+            <a:solidFill>
+              <a:schemeClr val="tx1"/>
+            </a:solidFill>
+          </a:ln>
+        </p:spPr>
+      </p:pic>
+      <p:pic>
+        <p:nvPicPr>
+          <p:cNvPr id="9" name="Picture 8" descr="A person smiling for a picture&#10;&#10;Description automatically generated with low confidence">
+            <a:extLst>
+              <a:ext uri="{FF2B5EF4-FFF2-40B4-BE49-F238E27FC236}">
+                <a16:creationId xmlns:a16="http://schemas.microsoft.com/office/drawing/2014/main" id="{3C8725EC-8671-9677-65B5-CD5FB002E0E9}"/>
+              </a:ext>
+            </a:extLst>
+          </p:cNvPr>
+          <p:cNvPicPr>
+            <a:picLocks noChangeAspect="1"/>
+          </p:cNvPicPr>
+          <p:nvPr/>
+        </p:nvPicPr>
+        <p:blipFill rotWithShape="1">
+          <a:blip r:embed="rId3">
+            <a:extLst>
+              <a:ext uri="{28A0092B-C50C-407E-A947-70E740481C1C}">
+                <a14:useLocalDpi xmlns:a14="http://schemas.microsoft.com/office/drawing/2010/main" val="0"/>
+              </a:ext>
+            </a:extLst>
+          </a:blip>
+          <a:srcRect l="2703"/>
+          <a:stretch/>
+        </p:blipFill>
+        <p:spPr>
+          <a:xfrm rot="5400000">
+            <a:off x="4733619" y="2036528"/>
+            <a:ext cx="806573" cy="928834"/>
+          </a:xfrm>
+          <a:prstGeom prst="rect">
+            <a:avLst/>
+          </a:prstGeom>
+        </p:spPr>
+      </p:pic>
+      <p:sp>
+        <p:nvSpPr>
+          <p:cNvPr id="18" name="Rectangle 17">
+            <a:extLst>
+              <a:ext uri="{FF2B5EF4-FFF2-40B4-BE49-F238E27FC236}">
+                <a16:creationId xmlns:a16="http://schemas.microsoft.com/office/drawing/2014/main" id="{2DF4A6BB-4BF0-8690-18F4-00813C66B55B}"/>
+              </a:ext>
+            </a:extLst>
+          </p:cNvPr>
+          <p:cNvSpPr/>
+          <p:nvPr/>
+        </p:nvSpPr>
+        <p:spPr>
+          <a:xfrm>
+            <a:off x="4115377" y="2038087"/>
+            <a:ext cx="2043058" cy="927275"/>
+          </a:xfrm>
+          <a:prstGeom prst="rect">
+            <a:avLst/>
+          </a:prstGeom>
+          <a:noFill/>
+          <a:ln w="28575" cap="flat" cmpd="sng" algn="ctr">
+            <a:solidFill>
+              <a:schemeClr val="dk1"/>
+            </a:solidFill>
+            <a:prstDash val="solid"/>
+            <a:round/>
+            <a:headEnd type="none" w="med" len="med"/>
+            <a:tailEnd type="none" w="med" len="med"/>
+          </a:ln>
+        </p:spPr>
+        <p:style>
+          <a:lnRef idx="0">
+            <a:scrgbClr r="0" g="0" b="0"/>
+          </a:lnRef>
+          <a:fillRef idx="0">
+            <a:scrgbClr r="0" g="0" b="0"/>
+          </a:fillRef>
+          <a:effectRef idx="0">
+            <a:scrgbClr r="0" g="0" b="0"/>
+          </a:effectRef>
+          <a:fontRef idx="minor">
+            <a:schemeClr val="dk1"/>
+          </a:fontRef>
+        </p:style>
+        <p:txBody>
+          <a:bodyPr rtlCol="0" anchor="ctr"/>
+          <a:lstStyle/>
+          <a:p>
+            <a:pPr algn="ctr"/>
+            <a:endParaRPr lang="en-DK"/>
+          </a:p>
+        </p:txBody>
+      </p:sp>
+      <p:sp>
+        <p:nvSpPr>
+          <p:cNvPr id="12" name="TextBox 11">
+            <a:extLst>
+              <a:ext uri="{FF2B5EF4-FFF2-40B4-BE49-F238E27FC236}">
+                <a16:creationId xmlns:a16="http://schemas.microsoft.com/office/drawing/2014/main" id="{E21A7FB1-71DB-7C90-2144-7E1BFAEB647F}"/>
+              </a:ext>
+            </a:extLst>
+          </p:cNvPr>
+          <p:cNvSpPr txBox="1"/>
+          <p:nvPr/>
+        </p:nvSpPr>
+        <p:spPr>
+          <a:xfrm>
+            <a:off x="4292364" y="2963720"/>
+            <a:ext cx="1689081" cy="253916"/>
+          </a:xfrm>
+          <a:prstGeom prst="rect">
+            <a:avLst/>
+          </a:prstGeom>
+          <a:noFill/>
+        </p:spPr>
+        <p:txBody>
+          <a:bodyPr wrap="square" rtlCol="0">
+            <a:spAutoFit/>
+          </a:bodyPr>
+          <a:lstStyle/>
+          <a:p>
+            <a:r>
+              <a:rPr lang="en-GB" sz="1050" dirty="0"/>
+              <a:t>Was this an edited picture? </a:t>
+            </a:r>
+            <a:endParaRPr lang="en-DK" sz="1050" dirty="0"/>
+          </a:p>
+        </p:txBody>
+      </p:sp>
+      <p:sp>
+        <p:nvSpPr>
+          <p:cNvPr id="21" name="TextBox 20">
+            <a:extLst>
+              <a:ext uri="{FF2B5EF4-FFF2-40B4-BE49-F238E27FC236}">
+                <a16:creationId xmlns:a16="http://schemas.microsoft.com/office/drawing/2014/main" id="{9EAEA5DC-975D-DD85-4036-5939F9286BE2}"/>
+              </a:ext>
+            </a:extLst>
+          </p:cNvPr>
+          <p:cNvSpPr txBox="1"/>
+          <p:nvPr/>
+        </p:nvSpPr>
+        <p:spPr>
+          <a:xfrm>
+            <a:off x="5185510" y="3145153"/>
+            <a:ext cx="383753" cy="338554"/>
+          </a:xfrm>
+          <a:prstGeom prst="rect">
+            <a:avLst/>
+          </a:prstGeom>
+          <a:noFill/>
+        </p:spPr>
+        <p:txBody>
+          <a:bodyPr wrap="square" rtlCol="0">
+            <a:spAutoFit/>
+          </a:bodyPr>
+          <a:lstStyle/>
+          <a:p>
+            <a:r>
+              <a:rPr lang="en-GB" sz="800" dirty="0"/>
+              <a:t>Yes</a:t>
+            </a:r>
+          </a:p>
+          <a:p>
+            <a:r>
+              <a:rPr lang="en-GB" sz="800" dirty="0">
+                <a:sym typeface="Wingdings" panose="05000000000000000000" pitchFamily="2" charset="2"/>
+              </a:rPr>
+              <a:t></a:t>
+            </a:r>
+            <a:endParaRPr lang="en-DK" sz="800" dirty="0"/>
+          </a:p>
+        </p:txBody>
+      </p:sp>
+      <p:sp>
+        <p:nvSpPr>
+          <p:cNvPr id="22" name="TextBox 21">
+            <a:extLst>
+              <a:ext uri="{FF2B5EF4-FFF2-40B4-BE49-F238E27FC236}">
+                <a16:creationId xmlns:a16="http://schemas.microsoft.com/office/drawing/2014/main" id="{10C2D934-DF2E-EBFF-B0C7-B3487F840121}"/>
+              </a:ext>
+            </a:extLst>
+          </p:cNvPr>
+          <p:cNvSpPr txBox="1"/>
+          <p:nvPr/>
+        </p:nvSpPr>
+        <p:spPr>
+          <a:xfrm>
+            <a:off x="4921925" y="3145153"/>
+            <a:ext cx="306940" cy="338554"/>
+          </a:xfrm>
+          <a:prstGeom prst="rect">
+            <a:avLst/>
+          </a:prstGeom>
+          <a:noFill/>
+        </p:spPr>
+        <p:txBody>
+          <a:bodyPr wrap="square" rtlCol="0">
+            <a:spAutoFit/>
+          </a:bodyPr>
+          <a:lstStyle/>
+          <a:p>
+            <a:r>
+              <a:rPr lang="en-GB" sz="800" dirty="0"/>
+              <a:t>No</a:t>
+            </a:r>
+          </a:p>
+          <a:p>
+            <a:r>
+              <a:rPr lang="en-GB" sz="800" dirty="0">
+                <a:sym typeface="Wingdings" panose="05000000000000000000" pitchFamily="2" charset="2"/>
+              </a:rPr>
+              <a:t></a:t>
+            </a:r>
+            <a:endParaRPr lang="en-DK" sz="800" dirty="0"/>
+          </a:p>
+        </p:txBody>
+      </p:sp>
+      <p:sp>
+        <p:nvSpPr>
+          <p:cNvPr id="26" name="TextBox 25">
+            <a:extLst>
+              <a:ext uri="{FF2B5EF4-FFF2-40B4-BE49-F238E27FC236}">
+                <a16:creationId xmlns:a16="http://schemas.microsoft.com/office/drawing/2014/main" id="{1AFC657B-E195-454B-8352-20FF4E72A776}"/>
+              </a:ext>
+            </a:extLst>
+          </p:cNvPr>
+          <p:cNvSpPr txBox="1"/>
+          <p:nvPr/>
+        </p:nvSpPr>
+        <p:spPr>
+          <a:xfrm>
+            <a:off x="1393371" y="2132881"/>
+            <a:ext cx="2635137" cy="646331"/>
+          </a:xfrm>
+          <a:prstGeom prst="rect">
+            <a:avLst/>
+          </a:prstGeom>
+          <a:noFill/>
+        </p:spPr>
+        <p:txBody>
+          <a:bodyPr wrap="square" rtlCol="0">
+            <a:spAutoFit/>
+          </a:bodyPr>
+          <a:lstStyle/>
+          <a:p>
+            <a:pPr algn="r"/>
+            <a:r>
+              <a:rPr lang="en-GB" dirty="0">
+                <a:latin typeface="Times New Roman" panose="02020603050405020304" pitchFamily="18" charset="0"/>
+                <a:cs typeface="Times New Roman" panose="02020603050405020304" pitchFamily="18" charset="0"/>
+              </a:rPr>
+              <a:t>Stimuli:</a:t>
+            </a:r>
+          </a:p>
+          <a:p>
+            <a:pPr algn="r"/>
+            <a:r>
+              <a:rPr lang="en-GB" dirty="0">
+                <a:latin typeface="Times New Roman" panose="02020603050405020304" pitchFamily="18" charset="0"/>
+                <a:cs typeface="Times New Roman" panose="02020603050405020304" pitchFamily="18" charset="0"/>
+              </a:rPr>
+              <a:t>  present until response</a:t>
+            </a:r>
+          </a:p>
+        </p:txBody>
+      </p:sp>
+      <p:sp>
+        <p:nvSpPr>
+          <p:cNvPr id="27" name="TextBox 26">
+            <a:extLst>
+              <a:ext uri="{FF2B5EF4-FFF2-40B4-BE49-F238E27FC236}">
+                <a16:creationId xmlns:a16="http://schemas.microsoft.com/office/drawing/2014/main" id="{C8777E9D-1C0F-5250-8C02-193D7CB49507}"/>
+              </a:ext>
+            </a:extLst>
+          </p:cNvPr>
+          <p:cNvSpPr txBox="1"/>
+          <p:nvPr/>
+        </p:nvSpPr>
+        <p:spPr>
+          <a:xfrm>
+            <a:off x="2807085" y="3755623"/>
+            <a:ext cx="1941701" cy="646331"/>
+          </a:xfrm>
+          <a:prstGeom prst="rect">
+            <a:avLst/>
+          </a:prstGeom>
+          <a:noFill/>
+        </p:spPr>
+        <p:txBody>
+          <a:bodyPr wrap="square" rtlCol="0">
+            <a:spAutoFit/>
+          </a:bodyPr>
+          <a:lstStyle/>
+          <a:p>
+            <a:pPr algn="r"/>
+            <a:r>
+              <a:rPr lang="en-GB" dirty="0">
+                <a:latin typeface="Times New Roman" panose="02020603050405020304" pitchFamily="18" charset="0"/>
+                <a:cs typeface="Times New Roman" panose="02020603050405020304" pitchFamily="18" charset="0"/>
+              </a:rPr>
+              <a:t>Noise:</a:t>
+            </a:r>
+          </a:p>
+          <a:p>
+            <a:pPr algn="r"/>
+            <a:r>
+              <a:rPr lang="en-GB" dirty="0">
+                <a:latin typeface="Times New Roman" panose="02020603050405020304" pitchFamily="18" charset="0"/>
+                <a:cs typeface="Times New Roman" panose="02020603050405020304" pitchFamily="18" charset="0"/>
+              </a:rPr>
+              <a:t>1000 ms</a:t>
+            </a:r>
+          </a:p>
+        </p:txBody>
+      </p:sp>
+    </p:spTree>
+    <p:extLst>
+      <p:ext uri="{BB962C8B-B14F-4D97-AF65-F5344CB8AC3E}">
+        <p14:creationId xmlns:p14="http://schemas.microsoft.com/office/powerpoint/2010/main" val="2944737114"/>
+      </p:ext>
+    </p:extLst>
+  </p:cSld>
+  <p:clrMapOvr>
+    <a:masterClrMapping/>
+  </p:clrMapOvr>
+</p:sld>
+</file>
+
+<file path=ppt/slides/slide3.xml><?xml version="1.0" encoding="utf-8"?>
+<p:sld xmlns:a="http://schemas.openxmlformats.org/drawingml/2006/main" xmlns:r="http://schemas.openxmlformats.org/officeDocument/2006/relationships" xmlns:p="http://schemas.openxmlformats.org/presentationml/2006/main">
+  <p:cSld>
+    <p:spTree>
+      <p:nvGrpSpPr>
+        <p:cNvPr id="1" name=""/>
+        <p:cNvGrpSpPr/>
+        <p:nvPr/>
+      </p:nvGrpSpPr>
+      <p:grpSpPr>
+        <a:xfrm>
+          <a:off x="0" y="0"/>
+          <a:ext cx="0" cy="0"/>
+          <a:chOff x="0" y="0"/>
+          <a:chExt cx="0" cy="0"/>
+        </a:xfrm>
+      </p:grpSpPr>
+      <p:pic>
+        <p:nvPicPr>
+          <p:cNvPr id="65" name="Picture 64">
+            <a:extLst>
+              <a:ext uri="{FF2B5EF4-FFF2-40B4-BE49-F238E27FC236}">
+                <a16:creationId xmlns:a16="http://schemas.microsoft.com/office/drawing/2014/main" id="{898981E4-A76F-3843-1C32-9D4DC614B313}"/>
+              </a:ext>
+            </a:extLst>
+          </p:cNvPr>
+          <p:cNvPicPr>
+            <a:picLocks noChangeAspect="1"/>
+          </p:cNvPicPr>
+          <p:nvPr/>
+        </p:nvPicPr>
+        <p:blipFill rotWithShape="1">
+          <a:blip r:embed="rId2"/>
+          <a:srcRect l="4887" r="17160" b="7988"/>
+          <a:stretch/>
+        </p:blipFill>
+        <p:spPr>
+          <a:xfrm>
+            <a:off x="1340778" y="248523"/>
+            <a:ext cx="2944078" cy="3141949"/>
+          </a:xfrm>
+          <a:prstGeom prst="rect">
+            <a:avLst/>
+          </a:prstGeom>
+          <a:ln w="19050">
+            <a:solidFill>
+              <a:schemeClr val="tx1"/>
+            </a:solidFill>
+          </a:ln>
+        </p:spPr>
+      </p:pic>
+      <p:pic>
+        <p:nvPicPr>
+          <p:cNvPr id="67" name="Picture 66">
+            <a:extLst>
+              <a:ext uri="{FF2B5EF4-FFF2-40B4-BE49-F238E27FC236}">
+                <a16:creationId xmlns:a16="http://schemas.microsoft.com/office/drawing/2014/main" id="{650E17C9-59AC-C611-D906-BA9637D9C204}"/>
+              </a:ext>
+            </a:extLst>
+          </p:cNvPr>
+          <p:cNvPicPr>
+            <a:picLocks noChangeAspect="1"/>
+          </p:cNvPicPr>
+          <p:nvPr/>
+        </p:nvPicPr>
+        <p:blipFill rotWithShape="1">
+          <a:blip r:embed="rId3"/>
+          <a:srcRect r="10280"/>
+          <a:stretch/>
+        </p:blipFill>
+        <p:spPr>
+          <a:xfrm>
+            <a:off x="2691297" y="993103"/>
+            <a:ext cx="2944078" cy="2981347"/>
+          </a:xfrm>
+          <a:prstGeom prst="rect">
+            <a:avLst/>
+          </a:prstGeom>
+          <a:ln w="19050">
+            <a:solidFill>
+              <a:schemeClr val="tx1"/>
+            </a:solidFill>
+          </a:ln>
+        </p:spPr>
+      </p:pic>
+      <p:pic>
+        <p:nvPicPr>
+          <p:cNvPr id="69" name="Picture 68">
+            <a:extLst>
+              <a:ext uri="{FF2B5EF4-FFF2-40B4-BE49-F238E27FC236}">
+                <a16:creationId xmlns:a16="http://schemas.microsoft.com/office/drawing/2014/main" id="{5F105017-01CB-6A84-1BF9-22F2FA530463}"/>
+              </a:ext>
+            </a:extLst>
+          </p:cNvPr>
+          <p:cNvPicPr>
+            <a:picLocks noChangeAspect="1"/>
+          </p:cNvPicPr>
+          <p:nvPr/>
+        </p:nvPicPr>
+        <p:blipFill rotWithShape="1">
+          <a:blip r:embed="rId4"/>
+          <a:srcRect l="5883" t="7121" r="13255" b="9234"/>
+          <a:stretch/>
+        </p:blipFill>
+        <p:spPr>
+          <a:xfrm>
+            <a:off x="4068622" y="1469205"/>
+            <a:ext cx="2830531" cy="3051424"/>
+          </a:xfrm>
+          <a:prstGeom prst="rect">
+            <a:avLst/>
+          </a:prstGeom>
+          <a:ln w="19050">
+            <a:solidFill>
+              <a:schemeClr val="tx1"/>
+            </a:solidFill>
+          </a:ln>
+        </p:spPr>
+      </p:pic>
+      <p:cxnSp>
+        <p:nvCxnSpPr>
+          <p:cNvPr id="70" name="Straight Arrow Connector 69">
+            <a:extLst>
+              <a:ext uri="{FF2B5EF4-FFF2-40B4-BE49-F238E27FC236}">
+                <a16:creationId xmlns:a16="http://schemas.microsoft.com/office/drawing/2014/main" id="{467F1740-F2CC-7341-ADE4-F6784E7B6A6C}"/>
+              </a:ext>
+            </a:extLst>
+          </p:cNvPr>
+          <p:cNvCxnSpPr>
+            <a:cxnSpLocks/>
+          </p:cNvCxnSpPr>
+          <p:nvPr/>
+        </p:nvCxnSpPr>
+        <p:spPr>
+          <a:xfrm>
+            <a:off x="904125" y="4450552"/>
+            <a:ext cx="5722819" cy="590764"/>
+          </a:xfrm>
+          <a:prstGeom prst="straightConnector1">
+            <a:avLst/>
+          </a:prstGeom>
+          <a:ln w="57150">
+            <a:solidFill>
+              <a:schemeClr val="tx1"/>
+            </a:solidFill>
+            <a:tailEnd type="triangle"/>
+          </a:ln>
+        </p:spPr>
+        <p:style>
+          <a:lnRef idx="1">
+            <a:schemeClr val="accent1"/>
+          </a:lnRef>
+          <a:fillRef idx="0">
+            <a:schemeClr val="accent1"/>
+          </a:fillRef>
+          <a:effectRef idx="0">
+            <a:schemeClr val="accent1"/>
+          </a:effectRef>
+          <a:fontRef idx="minor">
+            <a:schemeClr val="tx1"/>
+          </a:fontRef>
+        </p:style>
+      </p:cxnSp>
+      <p:sp>
+        <p:nvSpPr>
+          <p:cNvPr id="72" name="TextBox 71">
+            <a:extLst>
+              <a:ext uri="{FF2B5EF4-FFF2-40B4-BE49-F238E27FC236}">
+                <a16:creationId xmlns:a16="http://schemas.microsoft.com/office/drawing/2014/main" id="{1B420A7B-7C7D-88AA-774F-44E396F25819}"/>
+              </a:ext>
+            </a:extLst>
+          </p:cNvPr>
+          <p:cNvSpPr txBox="1"/>
+          <p:nvPr/>
+        </p:nvSpPr>
+        <p:spPr>
+          <a:xfrm rot="377591">
+            <a:off x="3066065" y="5128350"/>
+            <a:ext cx="4933136" cy="369332"/>
+          </a:xfrm>
+          <a:prstGeom prst="rect">
+            <a:avLst/>
+          </a:prstGeom>
+          <a:noFill/>
+        </p:spPr>
+        <p:txBody>
+          <a:bodyPr wrap="square" rtlCol="0">
+            <a:spAutoFit/>
+          </a:bodyPr>
+          <a:lstStyle/>
+          <a:p>
+            <a:r>
+              <a:rPr lang="en-GB" dirty="0">
+                <a:latin typeface="Times New Roman" panose="02020603050405020304" pitchFamily="18" charset="0"/>
+                <a:cs typeface="Times New Roman" panose="02020603050405020304" pitchFamily="18" charset="0"/>
+              </a:rPr>
+              <a:t>Loop for all 60 stimuli pictures</a:t>
+            </a:r>
+            <a:endParaRPr lang="en-DK" dirty="0">
+              <a:latin typeface="Times New Roman" panose="02020603050405020304" pitchFamily="18" charset="0"/>
+              <a:cs typeface="Times New Roman" panose="02020603050405020304" pitchFamily="18" charset="0"/>
+            </a:endParaRPr>
+          </a:p>
+        </p:txBody>
+      </p:sp>
+      <p:sp>
+        <p:nvSpPr>
+          <p:cNvPr id="2" name="Rectangle 1">
+            <a:extLst>
+              <a:ext uri="{FF2B5EF4-FFF2-40B4-BE49-F238E27FC236}">
+                <a16:creationId xmlns:a16="http://schemas.microsoft.com/office/drawing/2014/main" id="{BFB8B71D-C851-01AC-0AA9-78AEB03B8F5E}"/>
+              </a:ext>
+            </a:extLst>
+          </p:cNvPr>
+          <p:cNvSpPr/>
+          <p:nvPr/>
+        </p:nvSpPr>
+        <p:spPr>
+          <a:xfrm>
+            <a:off x="6087666" y="2361618"/>
+            <a:ext cx="468961" cy="195445"/>
+          </a:xfrm>
+          <a:prstGeom prst="rect">
+            <a:avLst/>
+          </a:prstGeom>
+          <a:ln>
+            <a:solidFill>
+              <a:schemeClr val="bg1"/>
+            </a:solidFill>
+          </a:ln>
+        </p:spPr>
+        <p:style>
+          <a:lnRef idx="2">
+            <a:schemeClr val="accent6"/>
+          </a:lnRef>
+          <a:fillRef idx="1">
+            <a:schemeClr val="lt1"/>
+          </a:fillRef>
+          <a:effectRef idx="0">
+            <a:schemeClr val="accent6"/>
+          </a:effectRef>
+          <a:fontRef idx="minor">
+            <a:schemeClr val="dk1"/>
+          </a:fontRef>
+        </p:style>
+        <p:txBody>
+          <a:bodyPr rtlCol="0" anchor="ctr"/>
+          <a:lstStyle/>
+          <a:p>
+            <a:pPr algn="ctr"/>
+            <a:endParaRPr lang="en-DK"/>
+          </a:p>
+        </p:txBody>
+      </p:sp>
+      <p:sp>
+        <p:nvSpPr>
+          <p:cNvPr id="3" name="Rectangle 2">
+            <a:extLst>
+              <a:ext uri="{FF2B5EF4-FFF2-40B4-BE49-F238E27FC236}">
+                <a16:creationId xmlns:a16="http://schemas.microsoft.com/office/drawing/2014/main" id="{0798F4A2-54CD-A676-4DB9-5AB538FD722A}"/>
+              </a:ext>
+            </a:extLst>
+          </p:cNvPr>
+          <p:cNvSpPr/>
+          <p:nvPr/>
+        </p:nvSpPr>
+        <p:spPr>
+          <a:xfrm>
+            <a:off x="6422986" y="2521906"/>
+            <a:ext cx="114009" cy="782941"/>
+          </a:xfrm>
+          <a:prstGeom prst="rect">
+            <a:avLst/>
+          </a:prstGeom>
+          <a:ln>
+            <a:solidFill>
+              <a:schemeClr val="bg1"/>
+            </a:solidFill>
+          </a:ln>
+        </p:spPr>
+        <p:style>
+          <a:lnRef idx="2">
+            <a:schemeClr val="accent6"/>
+          </a:lnRef>
+          <a:fillRef idx="1">
+            <a:schemeClr val="lt1"/>
+          </a:fillRef>
+          <a:effectRef idx="0">
+            <a:schemeClr val="accent6"/>
+          </a:effectRef>
+          <a:fontRef idx="minor">
+            <a:schemeClr val="dk1"/>
+          </a:fontRef>
+        </p:style>
+        <p:txBody>
+          <a:bodyPr rtlCol="0" anchor="ctr"/>
+          <a:lstStyle/>
+          <a:p>
+            <a:pPr algn="ctr"/>
+            <a:endParaRPr lang="en-DK"/>
+          </a:p>
+        </p:txBody>
+      </p:sp>
+      <p:sp>
+        <p:nvSpPr>
+          <p:cNvPr id="4" name="Rectangle 3">
+            <a:extLst>
+              <a:ext uri="{FF2B5EF4-FFF2-40B4-BE49-F238E27FC236}">
+                <a16:creationId xmlns:a16="http://schemas.microsoft.com/office/drawing/2014/main" id="{A8EC2CA9-0E78-718A-9A62-B450A6F4E0AB}"/>
+              </a:ext>
+            </a:extLst>
+          </p:cNvPr>
+          <p:cNvSpPr/>
+          <p:nvPr/>
+        </p:nvSpPr>
+        <p:spPr>
+          <a:xfrm>
+            <a:off x="4382123" y="3233555"/>
+            <a:ext cx="468961" cy="195445"/>
+          </a:xfrm>
+          <a:prstGeom prst="rect">
+            <a:avLst/>
+          </a:prstGeom>
+          <a:ln>
+            <a:solidFill>
+              <a:schemeClr val="bg1"/>
+            </a:solidFill>
+          </a:ln>
+        </p:spPr>
+        <p:style>
+          <a:lnRef idx="2">
+            <a:schemeClr val="accent6"/>
+          </a:lnRef>
+          <a:fillRef idx="1">
+            <a:schemeClr val="lt1"/>
+          </a:fillRef>
+          <a:effectRef idx="0">
+            <a:schemeClr val="accent6"/>
+          </a:effectRef>
+          <a:fontRef idx="minor">
+            <a:schemeClr val="dk1"/>
+          </a:fontRef>
+        </p:style>
+        <p:txBody>
+          <a:bodyPr rtlCol="0" anchor="ctr"/>
+          <a:lstStyle/>
+          <a:p>
+            <a:pPr algn="ctr"/>
+            <a:endParaRPr lang="en-DK"/>
+          </a:p>
+        </p:txBody>
+      </p:sp>
+      <p:sp>
+        <p:nvSpPr>
+          <p:cNvPr id="5" name="Rectangle 4">
+            <a:extLst>
+              <a:ext uri="{FF2B5EF4-FFF2-40B4-BE49-F238E27FC236}">
+                <a16:creationId xmlns:a16="http://schemas.microsoft.com/office/drawing/2014/main" id="{B4BBE839-6769-E22A-138C-1371C3B8326D}"/>
+              </a:ext>
+            </a:extLst>
+          </p:cNvPr>
+          <p:cNvSpPr/>
+          <p:nvPr/>
+        </p:nvSpPr>
+        <p:spPr>
+          <a:xfrm>
+            <a:off x="4519176" y="2483776"/>
+            <a:ext cx="114009" cy="782941"/>
+          </a:xfrm>
+          <a:prstGeom prst="rect">
+            <a:avLst/>
+          </a:prstGeom>
+          <a:ln>
+            <a:solidFill>
+              <a:schemeClr val="bg1"/>
+            </a:solidFill>
+          </a:ln>
+        </p:spPr>
+        <p:style>
+          <a:lnRef idx="2">
+            <a:schemeClr val="accent6"/>
+          </a:lnRef>
+          <a:fillRef idx="1">
+            <a:schemeClr val="lt1"/>
+          </a:fillRef>
+          <a:effectRef idx="0">
+            <a:schemeClr val="accent6"/>
+          </a:effectRef>
+          <a:fontRef idx="minor">
+            <a:schemeClr val="dk1"/>
+          </a:fontRef>
+        </p:style>
+        <p:txBody>
+          <a:bodyPr rtlCol="0" anchor="ctr"/>
+          <a:lstStyle/>
+          <a:p>
+            <a:pPr algn="ctr"/>
+            <a:endParaRPr lang="en-DK"/>
+          </a:p>
+        </p:txBody>
+      </p:sp>
+      <p:sp>
+        <p:nvSpPr>
+          <p:cNvPr id="6" name="Rectangle 5">
+            <a:extLst>
+              <a:ext uri="{FF2B5EF4-FFF2-40B4-BE49-F238E27FC236}">
+                <a16:creationId xmlns:a16="http://schemas.microsoft.com/office/drawing/2014/main" id="{535096B2-3E0E-81FF-9691-56C3F226281C}"/>
+              </a:ext>
+            </a:extLst>
+          </p:cNvPr>
+          <p:cNvSpPr/>
+          <p:nvPr/>
+        </p:nvSpPr>
+        <p:spPr>
+          <a:xfrm>
+            <a:off x="3240467" y="1978949"/>
+            <a:ext cx="114009" cy="782941"/>
+          </a:xfrm>
+          <a:prstGeom prst="rect">
+            <a:avLst/>
+          </a:prstGeom>
+          <a:ln>
+            <a:solidFill>
+              <a:schemeClr val="bg1"/>
+            </a:solidFill>
+          </a:ln>
+        </p:spPr>
+        <p:style>
+          <a:lnRef idx="2">
+            <a:schemeClr val="accent6"/>
+          </a:lnRef>
+          <a:fillRef idx="1">
+            <a:schemeClr val="lt1"/>
+          </a:fillRef>
+          <a:effectRef idx="0">
+            <a:schemeClr val="accent6"/>
+          </a:effectRef>
+          <a:fontRef idx="minor">
+            <a:schemeClr val="dk1"/>
+          </a:fontRef>
+        </p:style>
+        <p:txBody>
+          <a:bodyPr rtlCol="0" anchor="ctr"/>
+          <a:lstStyle/>
+          <a:p>
+            <a:pPr algn="ctr"/>
+            <a:endParaRPr lang="en-DK"/>
+          </a:p>
+        </p:txBody>
+      </p:sp>
+      <p:sp>
+        <p:nvSpPr>
+          <p:cNvPr id="7" name="Rectangle 6">
+            <a:extLst>
+              <a:ext uri="{FF2B5EF4-FFF2-40B4-BE49-F238E27FC236}">
+                <a16:creationId xmlns:a16="http://schemas.microsoft.com/office/drawing/2014/main" id="{0737BAF0-51C4-B386-E303-5E6176AD00B0}"/>
+              </a:ext>
+            </a:extLst>
+          </p:cNvPr>
+          <p:cNvSpPr/>
+          <p:nvPr/>
+        </p:nvSpPr>
+        <p:spPr>
+          <a:xfrm>
+            <a:off x="1861037" y="1357442"/>
+            <a:ext cx="114009" cy="782941"/>
+          </a:xfrm>
+          <a:prstGeom prst="rect">
+            <a:avLst/>
+          </a:prstGeom>
+          <a:ln>
+            <a:solidFill>
+              <a:schemeClr val="bg1"/>
+            </a:solidFill>
+          </a:ln>
+        </p:spPr>
+        <p:style>
+          <a:lnRef idx="2">
+            <a:schemeClr val="accent6"/>
+          </a:lnRef>
+          <a:fillRef idx="1">
+            <a:schemeClr val="lt1"/>
+          </a:fillRef>
+          <a:effectRef idx="0">
+            <a:schemeClr val="accent6"/>
+          </a:effectRef>
+          <a:fontRef idx="minor">
+            <a:schemeClr val="dk1"/>
+          </a:fontRef>
+        </p:style>
+        <p:txBody>
+          <a:bodyPr rtlCol="0" anchor="ctr"/>
+          <a:lstStyle/>
+          <a:p>
+            <a:pPr algn="ctr"/>
+            <a:endParaRPr lang="en-DK"/>
+          </a:p>
+        </p:txBody>
+      </p:sp>
+      <p:sp>
+        <p:nvSpPr>
+          <p:cNvPr id="8" name="Rectangle 7">
+            <a:extLst>
+              <a:ext uri="{FF2B5EF4-FFF2-40B4-BE49-F238E27FC236}">
+                <a16:creationId xmlns:a16="http://schemas.microsoft.com/office/drawing/2014/main" id="{1E3C6001-90F3-EDD0-1980-D624E725DB55}"/>
+              </a:ext>
+            </a:extLst>
+          </p:cNvPr>
+          <p:cNvSpPr/>
+          <p:nvPr/>
+        </p:nvSpPr>
+        <p:spPr>
+          <a:xfrm>
+            <a:off x="3088003" y="2760711"/>
+            <a:ext cx="468961" cy="195445"/>
+          </a:xfrm>
+          <a:prstGeom prst="rect">
+            <a:avLst/>
+          </a:prstGeom>
+          <a:ln>
+            <a:solidFill>
+              <a:schemeClr val="bg1"/>
+            </a:solidFill>
+          </a:ln>
+        </p:spPr>
+        <p:style>
+          <a:lnRef idx="2">
+            <a:schemeClr val="accent6"/>
+          </a:lnRef>
+          <a:fillRef idx="1">
+            <a:schemeClr val="lt1"/>
+          </a:fillRef>
+          <a:effectRef idx="0">
+            <a:schemeClr val="accent6"/>
+          </a:effectRef>
+          <a:fontRef idx="minor">
+            <a:schemeClr val="dk1"/>
+          </a:fontRef>
+        </p:style>
+        <p:txBody>
+          <a:bodyPr rtlCol="0" anchor="ctr"/>
+          <a:lstStyle/>
+          <a:p>
+            <a:pPr algn="ctr"/>
+            <a:endParaRPr lang="en-DK"/>
+          </a:p>
+        </p:txBody>
+      </p:sp>
+      <p:sp>
+        <p:nvSpPr>
+          <p:cNvPr id="9" name="Rectangle 8">
+            <a:extLst>
+              <a:ext uri="{FF2B5EF4-FFF2-40B4-BE49-F238E27FC236}">
+                <a16:creationId xmlns:a16="http://schemas.microsoft.com/office/drawing/2014/main" id="{9CE5337B-366D-83A4-6BA7-2A4415B4B3C0}"/>
+              </a:ext>
+            </a:extLst>
+          </p:cNvPr>
+          <p:cNvSpPr/>
+          <p:nvPr/>
+        </p:nvSpPr>
+        <p:spPr>
+          <a:xfrm>
+            <a:off x="1713271" y="2129323"/>
+            <a:ext cx="468961" cy="195445"/>
+          </a:xfrm>
+          <a:prstGeom prst="rect">
+            <a:avLst/>
+          </a:prstGeom>
+          <a:ln>
+            <a:solidFill>
+              <a:schemeClr val="bg1"/>
+            </a:solidFill>
+          </a:ln>
+        </p:spPr>
+        <p:style>
+          <a:lnRef idx="2">
+            <a:schemeClr val="accent6"/>
+          </a:lnRef>
+          <a:fillRef idx="1">
+            <a:schemeClr val="lt1"/>
+          </a:fillRef>
+          <a:effectRef idx="0">
+            <a:schemeClr val="accent6"/>
+          </a:effectRef>
+          <a:fontRef idx="minor">
+            <a:schemeClr val="dk1"/>
+          </a:fontRef>
+        </p:style>
+        <p:txBody>
+          <a:bodyPr rtlCol="0" anchor="ctr"/>
+          <a:lstStyle/>
+          <a:p>
+            <a:pPr algn="ctr"/>
+            <a:endParaRPr lang="en-DK"/>
+          </a:p>
+        </p:txBody>
+      </p:sp>
+    </p:spTree>
+    <p:extLst>
+      <p:ext uri="{BB962C8B-B14F-4D97-AF65-F5344CB8AC3E}">
+        <p14:creationId xmlns:p14="http://schemas.microsoft.com/office/powerpoint/2010/main" val="690076262"/>
+      </p:ext>
+    </p:extLst>
+  </p:cSld>
+  <p:clrMapOvr>
+    <a:masterClrMapping/>
+  </p:clrMapOvr>
+</p:sld>
+</file>
+
+<file path=ppt/slides/slide4.xml><?xml version="1.0" encoding="utf-8"?>
+<p:sld xmlns:a="http://schemas.openxmlformats.org/drawingml/2006/main" xmlns:r="http://schemas.openxmlformats.org/officeDocument/2006/relationships" xmlns:p="http://schemas.openxmlformats.org/presentationml/2006/main">
+  <p:cSld>
+    <p:spTree>
+      <p:nvGrpSpPr>
+        <p:cNvPr id="1" name=""/>
+        <p:cNvGrpSpPr/>
+        <p:nvPr/>
+      </p:nvGrpSpPr>
+      <p:grpSpPr>
+        <a:xfrm>
+          <a:off x="0" y="0"/>
+          <a:ext cx="0" cy="0"/>
+          <a:chOff x="0" y="0"/>
+          <a:chExt cx="0" cy="0"/>
+        </a:xfrm>
+      </p:grpSpPr>
+      <p:pic>
+        <p:nvPicPr>
+          <p:cNvPr id="30" name="Content Placeholder 29">
+            <a:extLst>
+              <a:ext uri="{FF2B5EF4-FFF2-40B4-BE49-F238E27FC236}">
+                <a16:creationId xmlns:a16="http://schemas.microsoft.com/office/drawing/2014/main" id="{4381F618-C048-9438-390A-5DC6C96E0605}"/>
+              </a:ext>
+            </a:extLst>
+          </p:cNvPr>
+          <p:cNvPicPr>
+            <a:picLocks noGrp="1" noChangeAspect="1"/>
+          </p:cNvPicPr>
+          <p:nvPr>
+            <p:ph idx="1"/>
+          </p:nvPr>
+        </p:nvPicPr>
+        <p:blipFill>
+          <a:blip r:embed="rId2"/>
+          <a:stretch>
+            <a:fillRect/>
+          </a:stretch>
+        </p:blipFill>
+        <p:spPr>
+          <a:xfrm>
+            <a:off x="648541" y="1583140"/>
+            <a:ext cx="4906378" cy="4086704"/>
+          </a:xfrm>
+        </p:spPr>
+      </p:pic>
+      <p:pic>
+        <p:nvPicPr>
+          <p:cNvPr id="6" name="Picture 5">
+            <a:extLst>
+              <a:ext uri="{FF2B5EF4-FFF2-40B4-BE49-F238E27FC236}">
+                <a16:creationId xmlns:a16="http://schemas.microsoft.com/office/drawing/2014/main" id="{8A5FE8A6-2DC0-8A5F-0E58-AB88B4AF1439}"/>
+              </a:ext>
+            </a:extLst>
+          </p:cNvPr>
+          <p:cNvPicPr>
+            <a:picLocks noChangeAspect="1"/>
+          </p:cNvPicPr>
+          <p:nvPr/>
+        </p:nvPicPr>
+        <p:blipFill rotWithShape="1">
+          <a:blip r:embed="rId3">
+            <a:extLst>
+              <a:ext uri="{BEBA8EAE-BF5A-486C-A8C5-ECC9F3942E4B}">
+                <a14:imgProps xmlns:a14="http://schemas.microsoft.com/office/drawing/2010/main">
+                  <a14:imgLayer r:embed="rId4">
+                    <a14:imgEffect>
+                      <a14:backgroundRemoval t="19231" b="85495" l="7775" r="78192">
+                        <a14:foregroundMark x1="15803" y1="23187" x2="41530" y2="33736"/>
+                        <a14:foregroundMark x1="10936" y1="32637" x2="27434" y2="33626"/>
+                        <a14:foregroundMark x1="27434" y1="33626" x2="39823" y2="30879"/>
+                        <a14:foregroundMark x1="9418" y1="24286" x2="47851" y2="15275"/>
+                        <a14:foregroundMark x1="47851" y1="15275" x2="66561" y2="20989"/>
+                        <a14:foregroundMark x1="66561" y1="20989" x2="76296" y2="76154"/>
+                        <a14:foregroundMark x1="76296" y1="76154" x2="70544" y2="82747"/>
+                        <a14:foregroundMark x1="70544" y1="82747" x2="37674" y2="78022"/>
+                        <a14:foregroundMark x1="37674" y1="78022" x2="9671" y2="38022"/>
+                        <a14:foregroundMark x1="9671" y1="38022" x2="8407" y2="25714"/>
+                        <a14:foregroundMark x1="8407" y1="25714" x2="11568" y2="23407"/>
+                        <a14:foregroundMark x1="16119" y1="36703" x2="45891" y2="50440"/>
+                        <a14:foregroundMark x1="40265" y1="43297" x2="52339" y2="41538"/>
+                        <a14:foregroundMark x1="56890" y1="26374" x2="42984" y2="25714"/>
+                        <a14:foregroundMark x1="40265" y1="25714" x2="47598" y2="29011"/>
+                        <a14:foregroundMark x1="41783" y1="28791" x2="41593" y2="36813"/>
+                        <a14:foregroundMark x1="38432" y1="20879" x2="49431" y2="24945"/>
+                        <a14:foregroundMark x1="49431" y1="24945" x2="58913" y2="34725"/>
+                        <a14:foregroundMark x1="58913" y1="34725" x2="43426" y2="38791"/>
+                        <a14:foregroundMark x1="43426" y1="38791" x2="40139" y2="25824"/>
+                        <a14:foregroundMark x1="40139" y1="25824" x2="45954" y2="22198"/>
+                        <a14:foregroundMark x1="69406" y1="33187" x2="75284" y2="85385"/>
+                        <a14:foregroundMark x1="75284" y1="85385" x2="67383" y2="85824"/>
+                        <a14:foregroundMark x1="67383" y1="85824" x2="60999" y2="79341"/>
+                        <a14:foregroundMark x1="60999" y1="79341" x2="60999" y2="79341"/>
+                        <a14:foregroundMark x1="71176" y1="67582" x2="76865" y2="84505"/>
+                        <a14:foregroundMark x1="76865" y1="84505" x2="68015" y2="85165"/>
+                        <a14:foregroundMark x1="68015" y1="85165" x2="67952" y2="85055"/>
+                        <a14:foregroundMark x1="57269" y1="30220" x2="60367" y2="46593"/>
+                        <a14:foregroundMark x1="48673" y1="46484" x2="65360" y2="40000"/>
+                        <a14:foregroundMark x1="65360" y1="40000" x2="66814" y2="78571"/>
+                        <a14:foregroundMark x1="66814" y1="78571" x2="67636" y2="80440"/>
+                        <a14:foregroundMark x1="76043" y1="68462" x2="78255" y2="83736"/>
+                        <a14:foregroundMark x1="78255" y1="83736" x2="78255" y2="83736"/>
+                        <a14:foregroundMark x1="7775" y1="23846" x2="8091" y2="37253"/>
+                        <a14:foregroundMark x1="49810" y1="29780" x2="49810" y2="29780"/>
+                      </a14:backgroundRemoval>
+                    </a14:imgEffect>
+                  </a14:imgLayer>
+                </a14:imgProps>
+              </a:ext>
+            </a:extLst>
+          </a:blip>
+          <a:srcRect l="6512" t="11700" r="22620" b="12449"/>
+          <a:stretch/>
+        </p:blipFill>
+        <p:spPr>
+          <a:xfrm>
+            <a:off x="5745371" y="2265743"/>
+            <a:ext cx="4444030" cy="2736025"/>
+          </a:xfrm>
+          <a:prstGeom prst="rect">
+            <a:avLst/>
+          </a:prstGeom>
+        </p:spPr>
+      </p:pic>
+      <p:cxnSp>
+        <p:nvCxnSpPr>
+          <p:cNvPr id="20" name="Straight Connector 19">
+            <a:extLst>
+              <a:ext uri="{FF2B5EF4-FFF2-40B4-BE49-F238E27FC236}">
+                <a16:creationId xmlns:a16="http://schemas.microsoft.com/office/drawing/2014/main" id="{F61D8B74-1275-F9D0-7F97-B3AF770451A0}"/>
+              </a:ext>
+            </a:extLst>
+          </p:cNvPr>
+          <p:cNvCxnSpPr>
+            <a:cxnSpLocks/>
+          </p:cNvCxnSpPr>
+          <p:nvPr/>
+        </p:nvCxnSpPr>
+        <p:spPr>
+          <a:xfrm>
+            <a:off x="5336275" y="0"/>
+            <a:ext cx="86435" cy="6858000"/>
+          </a:xfrm>
+          <a:prstGeom prst="line">
+            <a:avLst/>
+          </a:prstGeom>
+          <a:ln w="38100">
+            <a:solidFill>
+              <a:schemeClr val="tx1"/>
+            </a:solidFill>
+            <a:prstDash val="sysDash"/>
+          </a:ln>
+        </p:spPr>
+        <p:style>
+          <a:lnRef idx="1">
+            <a:schemeClr val="accent1"/>
+          </a:lnRef>
+          <a:fillRef idx="0">
+            <a:schemeClr val="accent1"/>
+          </a:fillRef>
+          <a:effectRef idx="0">
+            <a:schemeClr val="accent1"/>
+          </a:effectRef>
+          <a:fontRef idx="minor">
+            <a:schemeClr val="tx1"/>
+          </a:fontRef>
+        </p:style>
+      </p:cxnSp>
+    </p:spTree>
+    <p:extLst>
+      <p:ext uri="{BB962C8B-B14F-4D97-AF65-F5344CB8AC3E}">
+        <p14:creationId xmlns:p14="http://schemas.microsoft.com/office/powerpoint/2010/main" val="3278369293"/>
+      </p:ext>
+    </p:extLst>
+  </p:cSld>
+  <p:clrMapOvr>
+    <a:masterClrMapping/>
+  </p:clrMapOvr>
+</p:sld>
+</file>
+
 <file path=ppt/theme/theme1.xml><?xml version="1.0" encoding="utf-8"?>
 <a:theme xmlns:a="http://schemas.openxmlformats.org/drawingml/2006/main" name="Office Theme">
   <a:themeElements>

</xml_diff>